<commit_message>
Update Advanced Search Diagram
</commit_message>
<xml_diff>
--- a/coursework/Diagrams/Sequence-Diagram---Advanced-Search/Advanced_Search-System_Sequence_Diagram.pptx
+++ b/coursework/Diagrams/Sequence-Diagram---Advanced-Search/Advanced_Search-System_Sequence_Diagram.pptx
@@ -2,12 +2,12 @@
 <file path=ppt/presentation.xml><?xml version="1.0" encoding="utf-8"?>
 <p:presentation xmlns:a="http://schemas.openxmlformats.org/drawingml/2006/main" xmlns:r="http://schemas.openxmlformats.org/officeDocument/2006/relationships" xmlns:p="http://schemas.openxmlformats.org/presentationml/2006/main" saveSubsetFonts="1">
   <p:sldMasterIdLst>
-    <p:sldMasterId id="2147483684" r:id="rId1"/>
+    <p:sldMasterId id="2147483696" r:id="rId1"/>
   </p:sldMasterIdLst>
   <p:sldIdLst>
     <p:sldId id="256" r:id="rId2"/>
   </p:sldIdLst>
-  <p:sldSz cx="15119350" cy="8999538"/>
+  <p:sldSz cx="15119350" cy="10799763"/>
   <p:notesSz cx="6858000" cy="9144000"/>
   <p:defaultTextStyle>
     <a:defPPr>
@@ -141,15 +141,15 @@
         </p:nvSpPr>
         <p:spPr>
           <a:xfrm>
-            <a:off x="1889919" y="1472842"/>
-            <a:ext cx="11339513" cy="3133172"/>
+            <a:off x="1133951" y="1767462"/>
+            <a:ext cx="12851448" cy="3759917"/>
           </a:xfrm>
         </p:spPr>
         <p:txBody>
           <a:bodyPr anchor="b"/>
           <a:lstStyle>
             <a:lvl1pPr algn="ctr">
-              <a:defRPr sz="7441"/>
+              <a:defRPr sz="9449"/>
             </a:lvl1pPr>
           </a:lstStyle>
           <a:p>
@@ -173,8 +173,8 @@
         </p:nvSpPr>
         <p:spPr>
           <a:xfrm>
-            <a:off x="1889919" y="4726842"/>
-            <a:ext cx="11339513" cy="2172804"/>
+            <a:off x="1889919" y="5672376"/>
+            <a:ext cx="11339513" cy="2607442"/>
           </a:xfrm>
         </p:spPr>
         <p:txBody>
@@ -182,39 +182,39 @@
           <a:lstStyle>
             <a:lvl1pPr marL="0" indent="0" algn="ctr">
               <a:buNone/>
-              <a:defRPr sz="2976"/>
+              <a:defRPr sz="3780"/>
             </a:lvl1pPr>
-            <a:lvl2pPr marL="566974" indent="0" algn="ctr">
-              <a:buNone/>
-              <a:defRPr sz="2480"/>
+            <a:lvl2pPr marL="719999" indent="0" algn="ctr">
+              <a:buNone/>
+              <a:defRPr sz="3150"/>
             </a:lvl2pPr>
-            <a:lvl3pPr marL="1133947" indent="0" algn="ctr">
-              <a:buNone/>
-              <a:defRPr sz="2232"/>
+            <a:lvl3pPr marL="1439997" indent="0" algn="ctr">
+              <a:buNone/>
+              <a:defRPr sz="2835"/>
             </a:lvl3pPr>
-            <a:lvl4pPr marL="1700921" indent="0" algn="ctr">
-              <a:buNone/>
-              <a:defRPr sz="1984"/>
+            <a:lvl4pPr marL="2159996" indent="0" algn="ctr">
+              <a:buNone/>
+              <a:defRPr sz="2520"/>
             </a:lvl4pPr>
-            <a:lvl5pPr marL="2267895" indent="0" algn="ctr">
-              <a:buNone/>
-              <a:defRPr sz="1984"/>
+            <a:lvl5pPr marL="2879994" indent="0" algn="ctr">
+              <a:buNone/>
+              <a:defRPr sz="2520"/>
             </a:lvl5pPr>
-            <a:lvl6pPr marL="2834869" indent="0" algn="ctr">
-              <a:buNone/>
-              <a:defRPr sz="1984"/>
+            <a:lvl6pPr marL="3599993" indent="0" algn="ctr">
+              <a:buNone/>
+              <a:defRPr sz="2520"/>
             </a:lvl6pPr>
-            <a:lvl7pPr marL="3401842" indent="0" algn="ctr">
-              <a:buNone/>
-              <a:defRPr sz="1984"/>
+            <a:lvl7pPr marL="4319991" indent="0" algn="ctr">
+              <a:buNone/>
+              <a:defRPr sz="2520"/>
             </a:lvl7pPr>
-            <a:lvl8pPr marL="3968816" indent="0" algn="ctr">
-              <a:buNone/>
-              <a:defRPr sz="1984"/>
+            <a:lvl8pPr marL="5039990" indent="0" algn="ctr">
+              <a:buNone/>
+              <a:defRPr sz="2520"/>
             </a:lvl8pPr>
-            <a:lvl9pPr marL="4535790" indent="0" algn="ctr">
-              <a:buNone/>
-              <a:defRPr sz="1984"/>
+            <a:lvl9pPr marL="5759988" indent="0" algn="ctr">
+              <a:buNone/>
+              <a:defRPr sz="2520"/>
             </a:lvl9pPr>
           </a:lstStyle>
           <a:p>
@@ -243,7 +243,7 @@
           <a:p>
             <a:fld id="{F86A943B-CE53-490B-99DE-9227ACE8B16B}" type="datetimeFigureOut">
               <a:rPr lang="en-GB" smtClean="0"/>
-              <a:t>17/10/2016</a:t>
+              <a:t>21/10/2016</a:t>
             </a:fld>
             <a:endParaRPr lang="en-GB"/>
           </a:p>
@@ -294,7 +294,7 @@
     </p:spTree>
     <p:extLst>
       <p:ext uri="{BB962C8B-B14F-4D97-AF65-F5344CB8AC3E}">
-        <p14:creationId xmlns:p14="http://schemas.microsoft.com/office/powerpoint/2010/main" val="2622598701"/>
+        <p14:creationId xmlns:p14="http://schemas.microsoft.com/office/powerpoint/2010/main" val="842491569"/>
       </p:ext>
     </p:extLst>
   </p:cSld>
@@ -413,7 +413,7 @@
           <a:p>
             <a:fld id="{F86A943B-CE53-490B-99DE-9227ACE8B16B}" type="datetimeFigureOut">
               <a:rPr lang="en-GB" smtClean="0"/>
-              <a:t>17/10/2016</a:t>
+              <a:t>21/10/2016</a:t>
             </a:fld>
             <a:endParaRPr lang="en-GB"/>
           </a:p>
@@ -464,7 +464,7 @@
     </p:spTree>
     <p:extLst>
       <p:ext uri="{BB962C8B-B14F-4D97-AF65-F5344CB8AC3E}">
-        <p14:creationId xmlns:p14="http://schemas.microsoft.com/office/powerpoint/2010/main" val="900500411"/>
+        <p14:creationId xmlns:p14="http://schemas.microsoft.com/office/powerpoint/2010/main" val="3320868516"/>
       </p:ext>
     </p:extLst>
   </p:cSld>
@@ -503,8 +503,8 @@
         </p:nvSpPr>
         <p:spPr>
           <a:xfrm>
-            <a:off x="10819785" y="479142"/>
-            <a:ext cx="3260110" cy="7626692"/>
+            <a:off x="10819786" y="574987"/>
+            <a:ext cx="3260110" cy="9152300"/>
           </a:xfrm>
         </p:spPr>
         <p:txBody>
@@ -531,8 +531,8 @@
         </p:nvSpPr>
         <p:spPr>
           <a:xfrm>
-            <a:off x="1039455" y="479142"/>
-            <a:ext cx="9591338" cy="7626692"/>
+            <a:off x="1039456" y="574987"/>
+            <a:ext cx="9591338" cy="9152300"/>
           </a:xfrm>
         </p:spPr>
         <p:txBody>
@@ -593,7 +593,7 @@
           <a:p>
             <a:fld id="{F86A943B-CE53-490B-99DE-9227ACE8B16B}" type="datetimeFigureOut">
               <a:rPr lang="en-GB" smtClean="0"/>
-              <a:t>17/10/2016</a:t>
+              <a:t>21/10/2016</a:t>
             </a:fld>
             <a:endParaRPr lang="en-GB"/>
           </a:p>
@@ -644,7 +644,7 @@
     </p:spTree>
     <p:extLst>
       <p:ext uri="{BB962C8B-B14F-4D97-AF65-F5344CB8AC3E}">
-        <p14:creationId xmlns:p14="http://schemas.microsoft.com/office/powerpoint/2010/main" val="1881010454"/>
+        <p14:creationId xmlns:p14="http://schemas.microsoft.com/office/powerpoint/2010/main" val="648596498"/>
       </p:ext>
     </p:extLst>
   </p:cSld>
@@ -763,7 +763,7 @@
           <a:p>
             <a:fld id="{F86A943B-CE53-490B-99DE-9227ACE8B16B}" type="datetimeFigureOut">
               <a:rPr lang="en-GB" smtClean="0"/>
-              <a:t>17/10/2016</a:t>
+              <a:t>21/10/2016</a:t>
             </a:fld>
             <a:endParaRPr lang="en-GB"/>
           </a:p>
@@ -814,7 +814,7 @@
     </p:spTree>
     <p:extLst>
       <p:ext uri="{BB962C8B-B14F-4D97-AF65-F5344CB8AC3E}">
-        <p14:creationId xmlns:p14="http://schemas.microsoft.com/office/powerpoint/2010/main" val="848721354"/>
+        <p14:creationId xmlns:p14="http://schemas.microsoft.com/office/powerpoint/2010/main" val="41870022"/>
       </p:ext>
     </p:extLst>
   </p:cSld>
@@ -853,15 +853,15 @@
         </p:nvSpPr>
         <p:spPr>
           <a:xfrm>
-            <a:off x="1031581" y="2243636"/>
-            <a:ext cx="13040439" cy="3743557"/>
+            <a:off x="1031582" y="2692444"/>
+            <a:ext cx="13040439" cy="4492401"/>
           </a:xfrm>
         </p:spPr>
         <p:txBody>
           <a:bodyPr anchor="b"/>
           <a:lstStyle>
             <a:lvl1pPr>
-              <a:defRPr sz="7441"/>
+              <a:defRPr sz="9449"/>
             </a:lvl1pPr>
           </a:lstStyle>
           <a:p>
@@ -885,8 +885,8 @@
         </p:nvSpPr>
         <p:spPr>
           <a:xfrm>
-            <a:off x="1031581" y="6022609"/>
-            <a:ext cx="13040439" cy="1968648"/>
+            <a:off x="1031582" y="7227345"/>
+            <a:ext cx="13040439" cy="2362447"/>
           </a:xfrm>
         </p:spPr>
         <p:txBody>
@@ -894,17 +894,15 @@
           <a:lstStyle>
             <a:lvl1pPr marL="0" indent="0">
               <a:buNone/>
-              <a:defRPr sz="2976">
+              <a:defRPr sz="3780">
                 <a:solidFill>
-                  <a:schemeClr val="tx1">
-                    <a:tint val="75000"/>
-                  </a:schemeClr>
+                  <a:schemeClr val="tx1"/>
                 </a:solidFill>
               </a:defRPr>
             </a:lvl1pPr>
-            <a:lvl2pPr marL="566974" indent="0">
-              <a:buNone/>
-              <a:defRPr sz="2480">
+            <a:lvl2pPr marL="719999" indent="0">
+              <a:buNone/>
+              <a:defRPr sz="3150">
                 <a:solidFill>
                   <a:schemeClr val="tx1">
                     <a:tint val="75000"/>
@@ -912,9 +910,9 @@
                 </a:solidFill>
               </a:defRPr>
             </a:lvl2pPr>
-            <a:lvl3pPr marL="1133947" indent="0">
-              <a:buNone/>
-              <a:defRPr sz="2232">
+            <a:lvl3pPr marL="1439997" indent="0">
+              <a:buNone/>
+              <a:defRPr sz="2835">
                 <a:solidFill>
                   <a:schemeClr val="tx1">
                     <a:tint val="75000"/>
@@ -922,9 +920,9 @@
                 </a:solidFill>
               </a:defRPr>
             </a:lvl3pPr>
-            <a:lvl4pPr marL="1700921" indent="0">
-              <a:buNone/>
-              <a:defRPr sz="1984">
+            <a:lvl4pPr marL="2159996" indent="0">
+              <a:buNone/>
+              <a:defRPr sz="2520">
                 <a:solidFill>
                   <a:schemeClr val="tx1">
                     <a:tint val="75000"/>
@@ -932,9 +930,9 @@
                 </a:solidFill>
               </a:defRPr>
             </a:lvl4pPr>
-            <a:lvl5pPr marL="2267895" indent="0">
-              <a:buNone/>
-              <a:defRPr sz="1984">
+            <a:lvl5pPr marL="2879994" indent="0">
+              <a:buNone/>
+              <a:defRPr sz="2520">
                 <a:solidFill>
                   <a:schemeClr val="tx1">
                     <a:tint val="75000"/>
@@ -942,9 +940,9 @@
                 </a:solidFill>
               </a:defRPr>
             </a:lvl5pPr>
-            <a:lvl6pPr marL="2834869" indent="0">
-              <a:buNone/>
-              <a:defRPr sz="1984">
+            <a:lvl6pPr marL="3599993" indent="0">
+              <a:buNone/>
+              <a:defRPr sz="2520">
                 <a:solidFill>
                   <a:schemeClr val="tx1">
                     <a:tint val="75000"/>
@@ -952,9 +950,9 @@
                 </a:solidFill>
               </a:defRPr>
             </a:lvl6pPr>
-            <a:lvl7pPr marL="3401842" indent="0">
-              <a:buNone/>
-              <a:defRPr sz="1984">
+            <a:lvl7pPr marL="4319991" indent="0">
+              <a:buNone/>
+              <a:defRPr sz="2520">
                 <a:solidFill>
                   <a:schemeClr val="tx1">
                     <a:tint val="75000"/>
@@ -962,9 +960,9 @@
                 </a:solidFill>
               </a:defRPr>
             </a:lvl7pPr>
-            <a:lvl8pPr marL="3968816" indent="0">
-              <a:buNone/>
-              <a:defRPr sz="1984">
+            <a:lvl8pPr marL="5039990" indent="0">
+              <a:buNone/>
+              <a:defRPr sz="2520">
                 <a:solidFill>
                   <a:schemeClr val="tx1">
                     <a:tint val="75000"/>
@@ -972,9 +970,9 @@
                 </a:solidFill>
               </a:defRPr>
             </a:lvl8pPr>
-            <a:lvl9pPr marL="4535790" indent="0">
-              <a:buNone/>
-              <a:defRPr sz="1984">
+            <a:lvl9pPr marL="5759988" indent="0">
+              <a:buNone/>
+              <a:defRPr sz="2520">
                 <a:solidFill>
                   <a:schemeClr val="tx1">
                     <a:tint val="75000"/>
@@ -1009,7 +1007,7 @@
           <a:p>
             <a:fld id="{F86A943B-CE53-490B-99DE-9227ACE8B16B}" type="datetimeFigureOut">
               <a:rPr lang="en-GB" smtClean="0"/>
-              <a:t>17/10/2016</a:t>
+              <a:t>21/10/2016</a:t>
             </a:fld>
             <a:endParaRPr lang="en-GB"/>
           </a:p>
@@ -1060,7 +1058,7 @@
     </p:spTree>
     <p:extLst>
       <p:ext uri="{BB962C8B-B14F-4D97-AF65-F5344CB8AC3E}">
-        <p14:creationId xmlns:p14="http://schemas.microsoft.com/office/powerpoint/2010/main" val="1007891999"/>
+        <p14:creationId xmlns:p14="http://schemas.microsoft.com/office/powerpoint/2010/main" val="3514072807"/>
       </p:ext>
     </p:extLst>
   </p:cSld>
@@ -1122,8 +1120,8 @@
         </p:nvSpPr>
         <p:spPr>
           <a:xfrm>
-            <a:off x="1039455" y="2395710"/>
-            <a:ext cx="6425724" cy="5710124"/>
+            <a:off x="1039455" y="2874937"/>
+            <a:ext cx="6425724" cy="6852350"/>
           </a:xfrm>
         </p:spPr>
         <p:txBody>
@@ -1179,8 +1177,8 @@
         </p:nvSpPr>
         <p:spPr>
           <a:xfrm>
-            <a:off x="7654171" y="2395710"/>
-            <a:ext cx="6425724" cy="5710124"/>
+            <a:off x="7654171" y="2874937"/>
+            <a:ext cx="6425724" cy="6852350"/>
           </a:xfrm>
         </p:spPr>
         <p:txBody>
@@ -1241,7 +1239,7 @@
           <a:p>
             <a:fld id="{F86A943B-CE53-490B-99DE-9227ACE8B16B}" type="datetimeFigureOut">
               <a:rPr lang="en-GB" smtClean="0"/>
-              <a:t>17/10/2016</a:t>
+              <a:t>21/10/2016</a:t>
             </a:fld>
             <a:endParaRPr lang="en-GB"/>
           </a:p>
@@ -1292,7 +1290,7 @@
     </p:spTree>
     <p:extLst>
       <p:ext uri="{BB962C8B-B14F-4D97-AF65-F5344CB8AC3E}">
-        <p14:creationId xmlns:p14="http://schemas.microsoft.com/office/powerpoint/2010/main" val="406563804"/>
+        <p14:creationId xmlns:p14="http://schemas.microsoft.com/office/powerpoint/2010/main" val="2712053841"/>
       </p:ext>
     </p:extLst>
   </p:cSld>
@@ -1331,8 +1329,8 @@
         </p:nvSpPr>
         <p:spPr>
           <a:xfrm>
-            <a:off x="1041425" y="479143"/>
-            <a:ext cx="13040439" cy="1739495"/>
+            <a:off x="1041425" y="574990"/>
+            <a:ext cx="13040439" cy="2087455"/>
           </a:xfrm>
         </p:spPr>
         <p:txBody>
@@ -1359,8 +1357,8 @@
         </p:nvSpPr>
         <p:spPr>
           <a:xfrm>
-            <a:off x="1041425" y="2206137"/>
-            <a:ext cx="6396193" cy="1081194"/>
+            <a:off x="1041426" y="2647443"/>
+            <a:ext cx="6396193" cy="1297471"/>
           </a:xfrm>
         </p:spPr>
         <p:txBody>
@@ -1368,39 +1366,39 @@
           <a:lstStyle>
             <a:lvl1pPr marL="0" indent="0">
               <a:buNone/>
-              <a:defRPr sz="2976" b="1"/>
+              <a:defRPr sz="3780" b="1"/>
             </a:lvl1pPr>
-            <a:lvl2pPr marL="566974" indent="0">
-              <a:buNone/>
-              <a:defRPr sz="2480" b="1"/>
+            <a:lvl2pPr marL="719999" indent="0">
+              <a:buNone/>
+              <a:defRPr sz="3150" b="1"/>
             </a:lvl2pPr>
-            <a:lvl3pPr marL="1133947" indent="0">
-              <a:buNone/>
-              <a:defRPr sz="2232" b="1"/>
+            <a:lvl3pPr marL="1439997" indent="0">
+              <a:buNone/>
+              <a:defRPr sz="2835" b="1"/>
             </a:lvl3pPr>
-            <a:lvl4pPr marL="1700921" indent="0">
-              <a:buNone/>
-              <a:defRPr sz="1984" b="1"/>
+            <a:lvl4pPr marL="2159996" indent="0">
+              <a:buNone/>
+              <a:defRPr sz="2520" b="1"/>
             </a:lvl4pPr>
-            <a:lvl5pPr marL="2267895" indent="0">
-              <a:buNone/>
-              <a:defRPr sz="1984" b="1"/>
+            <a:lvl5pPr marL="2879994" indent="0">
+              <a:buNone/>
+              <a:defRPr sz="2520" b="1"/>
             </a:lvl5pPr>
-            <a:lvl6pPr marL="2834869" indent="0">
-              <a:buNone/>
-              <a:defRPr sz="1984" b="1"/>
+            <a:lvl6pPr marL="3599993" indent="0">
+              <a:buNone/>
+              <a:defRPr sz="2520" b="1"/>
             </a:lvl6pPr>
-            <a:lvl7pPr marL="3401842" indent="0">
-              <a:buNone/>
-              <a:defRPr sz="1984" b="1"/>
+            <a:lvl7pPr marL="4319991" indent="0">
+              <a:buNone/>
+              <a:defRPr sz="2520" b="1"/>
             </a:lvl7pPr>
-            <a:lvl8pPr marL="3968816" indent="0">
-              <a:buNone/>
-              <a:defRPr sz="1984" b="1"/>
+            <a:lvl8pPr marL="5039990" indent="0">
+              <a:buNone/>
+              <a:defRPr sz="2520" b="1"/>
             </a:lvl8pPr>
-            <a:lvl9pPr marL="4535790" indent="0">
-              <a:buNone/>
-              <a:defRPr sz="1984" b="1"/>
+            <a:lvl9pPr marL="5759988" indent="0">
+              <a:buNone/>
+              <a:defRPr sz="2520" b="1"/>
             </a:lvl9pPr>
           </a:lstStyle>
           <a:p>
@@ -1424,8 +1422,8 @@
         </p:nvSpPr>
         <p:spPr>
           <a:xfrm>
-            <a:off x="1041425" y="3287331"/>
-            <a:ext cx="6396193" cy="4835169"/>
+            <a:off x="1041426" y="3944914"/>
+            <a:ext cx="6396193" cy="5802373"/>
           </a:xfrm>
         </p:spPr>
         <p:txBody>
@@ -1481,8 +1479,8 @@
         </p:nvSpPr>
         <p:spPr>
           <a:xfrm>
-            <a:off x="7654171" y="2206137"/>
-            <a:ext cx="6427693" cy="1081194"/>
+            <a:off x="7654172" y="2647443"/>
+            <a:ext cx="6427693" cy="1297471"/>
           </a:xfrm>
         </p:spPr>
         <p:txBody>
@@ -1490,39 +1488,39 @@
           <a:lstStyle>
             <a:lvl1pPr marL="0" indent="0">
               <a:buNone/>
-              <a:defRPr sz="2976" b="1"/>
+              <a:defRPr sz="3780" b="1"/>
             </a:lvl1pPr>
-            <a:lvl2pPr marL="566974" indent="0">
-              <a:buNone/>
-              <a:defRPr sz="2480" b="1"/>
+            <a:lvl2pPr marL="719999" indent="0">
+              <a:buNone/>
+              <a:defRPr sz="3150" b="1"/>
             </a:lvl2pPr>
-            <a:lvl3pPr marL="1133947" indent="0">
-              <a:buNone/>
-              <a:defRPr sz="2232" b="1"/>
+            <a:lvl3pPr marL="1439997" indent="0">
+              <a:buNone/>
+              <a:defRPr sz="2835" b="1"/>
             </a:lvl3pPr>
-            <a:lvl4pPr marL="1700921" indent="0">
-              <a:buNone/>
-              <a:defRPr sz="1984" b="1"/>
+            <a:lvl4pPr marL="2159996" indent="0">
+              <a:buNone/>
+              <a:defRPr sz="2520" b="1"/>
             </a:lvl4pPr>
-            <a:lvl5pPr marL="2267895" indent="0">
-              <a:buNone/>
-              <a:defRPr sz="1984" b="1"/>
+            <a:lvl5pPr marL="2879994" indent="0">
+              <a:buNone/>
+              <a:defRPr sz="2520" b="1"/>
             </a:lvl5pPr>
-            <a:lvl6pPr marL="2834869" indent="0">
-              <a:buNone/>
-              <a:defRPr sz="1984" b="1"/>
+            <a:lvl6pPr marL="3599993" indent="0">
+              <a:buNone/>
+              <a:defRPr sz="2520" b="1"/>
             </a:lvl6pPr>
-            <a:lvl7pPr marL="3401842" indent="0">
-              <a:buNone/>
-              <a:defRPr sz="1984" b="1"/>
+            <a:lvl7pPr marL="4319991" indent="0">
+              <a:buNone/>
+              <a:defRPr sz="2520" b="1"/>
             </a:lvl7pPr>
-            <a:lvl8pPr marL="3968816" indent="0">
-              <a:buNone/>
-              <a:defRPr sz="1984" b="1"/>
+            <a:lvl8pPr marL="5039990" indent="0">
+              <a:buNone/>
+              <a:defRPr sz="2520" b="1"/>
             </a:lvl8pPr>
-            <a:lvl9pPr marL="4535790" indent="0">
-              <a:buNone/>
-              <a:defRPr sz="1984" b="1"/>
+            <a:lvl9pPr marL="5759988" indent="0">
+              <a:buNone/>
+              <a:defRPr sz="2520" b="1"/>
             </a:lvl9pPr>
           </a:lstStyle>
           <a:p>
@@ -1546,8 +1544,8 @@
         </p:nvSpPr>
         <p:spPr>
           <a:xfrm>
-            <a:off x="7654171" y="3287331"/>
-            <a:ext cx="6427693" cy="4835169"/>
+            <a:off x="7654172" y="3944914"/>
+            <a:ext cx="6427693" cy="5802373"/>
           </a:xfrm>
         </p:spPr>
         <p:txBody>
@@ -1608,7 +1606,7 @@
           <a:p>
             <a:fld id="{F86A943B-CE53-490B-99DE-9227ACE8B16B}" type="datetimeFigureOut">
               <a:rPr lang="en-GB" smtClean="0"/>
-              <a:t>17/10/2016</a:t>
+              <a:t>21/10/2016</a:t>
             </a:fld>
             <a:endParaRPr lang="en-GB"/>
           </a:p>
@@ -1659,7 +1657,7 @@
     </p:spTree>
     <p:extLst>
       <p:ext uri="{BB962C8B-B14F-4D97-AF65-F5344CB8AC3E}">
-        <p14:creationId xmlns:p14="http://schemas.microsoft.com/office/powerpoint/2010/main" val="3378697444"/>
+        <p14:creationId xmlns:p14="http://schemas.microsoft.com/office/powerpoint/2010/main" val="1740707599"/>
       </p:ext>
     </p:extLst>
   </p:cSld>
@@ -1726,7 +1724,7 @@
           <a:p>
             <a:fld id="{F86A943B-CE53-490B-99DE-9227ACE8B16B}" type="datetimeFigureOut">
               <a:rPr lang="en-GB" smtClean="0"/>
-              <a:t>17/10/2016</a:t>
+              <a:t>21/10/2016</a:t>
             </a:fld>
             <a:endParaRPr lang="en-GB"/>
           </a:p>
@@ -1777,7 +1775,7 @@
     </p:spTree>
     <p:extLst>
       <p:ext uri="{BB962C8B-B14F-4D97-AF65-F5344CB8AC3E}">
-        <p14:creationId xmlns:p14="http://schemas.microsoft.com/office/powerpoint/2010/main" val="3938536197"/>
+        <p14:creationId xmlns:p14="http://schemas.microsoft.com/office/powerpoint/2010/main" val="3456688212"/>
       </p:ext>
     </p:extLst>
   </p:cSld>
@@ -1821,7 +1819,7 @@
           <a:p>
             <a:fld id="{F86A943B-CE53-490B-99DE-9227ACE8B16B}" type="datetimeFigureOut">
               <a:rPr lang="en-GB" smtClean="0"/>
-              <a:t>17/10/2016</a:t>
+              <a:t>21/10/2016</a:t>
             </a:fld>
             <a:endParaRPr lang="en-GB"/>
           </a:p>
@@ -1872,7 +1870,7 @@
     </p:spTree>
     <p:extLst>
       <p:ext uri="{BB962C8B-B14F-4D97-AF65-F5344CB8AC3E}">
-        <p14:creationId xmlns:p14="http://schemas.microsoft.com/office/powerpoint/2010/main" val="4080550848"/>
+        <p14:creationId xmlns:p14="http://schemas.microsoft.com/office/powerpoint/2010/main" val="1122868052"/>
       </p:ext>
     </p:extLst>
   </p:cSld>
@@ -1911,15 +1909,15 @@
         </p:nvSpPr>
         <p:spPr>
           <a:xfrm>
-            <a:off x="1041425" y="599969"/>
-            <a:ext cx="4876383" cy="2099892"/>
+            <a:off x="1041425" y="719984"/>
+            <a:ext cx="4876384" cy="2519945"/>
           </a:xfrm>
         </p:spPr>
         <p:txBody>
           <a:bodyPr anchor="b"/>
           <a:lstStyle>
             <a:lvl1pPr>
-              <a:defRPr sz="3968"/>
+              <a:defRPr sz="5039"/>
             </a:lvl1pPr>
           </a:lstStyle>
           <a:p>
@@ -1943,39 +1941,39 @@
         </p:nvSpPr>
         <p:spPr>
           <a:xfrm>
-            <a:off x="6427693" y="1295767"/>
-            <a:ext cx="7654171" cy="6395505"/>
+            <a:off x="6427693" y="1554968"/>
+            <a:ext cx="7654171" cy="7674832"/>
           </a:xfrm>
         </p:spPr>
         <p:txBody>
           <a:bodyPr/>
           <a:lstStyle>
             <a:lvl1pPr>
-              <a:defRPr sz="3968"/>
+              <a:defRPr sz="5039"/>
             </a:lvl1pPr>
             <a:lvl2pPr>
-              <a:defRPr sz="3472"/>
+              <a:defRPr sz="4409"/>
             </a:lvl2pPr>
             <a:lvl3pPr>
-              <a:defRPr sz="2976"/>
+              <a:defRPr sz="3780"/>
             </a:lvl3pPr>
             <a:lvl4pPr>
-              <a:defRPr sz="2480"/>
+              <a:defRPr sz="3150"/>
             </a:lvl4pPr>
             <a:lvl5pPr>
-              <a:defRPr sz="2480"/>
+              <a:defRPr sz="3150"/>
             </a:lvl5pPr>
             <a:lvl6pPr>
-              <a:defRPr sz="2480"/>
+              <a:defRPr sz="3150"/>
             </a:lvl6pPr>
             <a:lvl7pPr>
-              <a:defRPr sz="2480"/>
+              <a:defRPr sz="3150"/>
             </a:lvl7pPr>
             <a:lvl8pPr>
-              <a:defRPr sz="2480"/>
+              <a:defRPr sz="3150"/>
             </a:lvl8pPr>
             <a:lvl9pPr>
-              <a:defRPr sz="2480"/>
+              <a:defRPr sz="3150"/>
             </a:lvl9pPr>
           </a:lstStyle>
           <a:p>
@@ -2028,8 +2026,8 @@
         </p:nvSpPr>
         <p:spPr>
           <a:xfrm>
-            <a:off x="1041425" y="2699862"/>
-            <a:ext cx="4876383" cy="5001827"/>
+            <a:off x="1041425" y="3239929"/>
+            <a:ext cx="4876384" cy="6002369"/>
           </a:xfrm>
         </p:spPr>
         <p:txBody>
@@ -2037,39 +2035,39 @@
           <a:lstStyle>
             <a:lvl1pPr marL="0" indent="0">
               <a:buNone/>
-              <a:defRPr sz="1984"/>
+              <a:defRPr sz="2520"/>
             </a:lvl1pPr>
-            <a:lvl2pPr marL="566974" indent="0">
-              <a:buNone/>
-              <a:defRPr sz="1736"/>
+            <a:lvl2pPr marL="719999" indent="0">
+              <a:buNone/>
+              <a:defRPr sz="2205"/>
             </a:lvl2pPr>
-            <a:lvl3pPr marL="1133947" indent="0">
-              <a:buNone/>
-              <a:defRPr sz="1488"/>
+            <a:lvl3pPr marL="1439997" indent="0">
+              <a:buNone/>
+              <a:defRPr sz="1890"/>
             </a:lvl3pPr>
-            <a:lvl4pPr marL="1700921" indent="0">
-              <a:buNone/>
-              <a:defRPr sz="1240"/>
+            <a:lvl4pPr marL="2159996" indent="0">
+              <a:buNone/>
+              <a:defRPr sz="1575"/>
             </a:lvl4pPr>
-            <a:lvl5pPr marL="2267895" indent="0">
-              <a:buNone/>
-              <a:defRPr sz="1240"/>
+            <a:lvl5pPr marL="2879994" indent="0">
+              <a:buNone/>
+              <a:defRPr sz="1575"/>
             </a:lvl5pPr>
-            <a:lvl6pPr marL="2834869" indent="0">
-              <a:buNone/>
-              <a:defRPr sz="1240"/>
+            <a:lvl6pPr marL="3599993" indent="0">
+              <a:buNone/>
+              <a:defRPr sz="1575"/>
             </a:lvl6pPr>
-            <a:lvl7pPr marL="3401842" indent="0">
-              <a:buNone/>
-              <a:defRPr sz="1240"/>
+            <a:lvl7pPr marL="4319991" indent="0">
+              <a:buNone/>
+              <a:defRPr sz="1575"/>
             </a:lvl7pPr>
-            <a:lvl8pPr marL="3968816" indent="0">
-              <a:buNone/>
-              <a:defRPr sz="1240"/>
+            <a:lvl8pPr marL="5039990" indent="0">
+              <a:buNone/>
+              <a:defRPr sz="1575"/>
             </a:lvl8pPr>
-            <a:lvl9pPr marL="4535790" indent="0">
-              <a:buNone/>
-              <a:defRPr sz="1240"/>
+            <a:lvl9pPr marL="5759988" indent="0">
+              <a:buNone/>
+              <a:defRPr sz="1575"/>
             </a:lvl9pPr>
           </a:lstStyle>
           <a:p>
@@ -2098,7 +2096,7 @@
           <a:p>
             <a:fld id="{F86A943B-CE53-490B-99DE-9227ACE8B16B}" type="datetimeFigureOut">
               <a:rPr lang="en-GB" smtClean="0"/>
-              <a:t>17/10/2016</a:t>
+              <a:t>21/10/2016</a:t>
             </a:fld>
             <a:endParaRPr lang="en-GB"/>
           </a:p>
@@ -2149,7 +2147,7 @@
     </p:spTree>
     <p:extLst>
       <p:ext uri="{BB962C8B-B14F-4D97-AF65-F5344CB8AC3E}">
-        <p14:creationId xmlns:p14="http://schemas.microsoft.com/office/powerpoint/2010/main" val="1346053014"/>
+        <p14:creationId xmlns:p14="http://schemas.microsoft.com/office/powerpoint/2010/main" val="1057147202"/>
       </p:ext>
     </p:extLst>
   </p:cSld>
@@ -2188,15 +2186,15 @@
         </p:nvSpPr>
         <p:spPr>
           <a:xfrm>
-            <a:off x="1041425" y="599969"/>
-            <a:ext cx="4876383" cy="2099892"/>
+            <a:off x="1041425" y="719984"/>
+            <a:ext cx="4876384" cy="2519945"/>
           </a:xfrm>
         </p:spPr>
         <p:txBody>
           <a:bodyPr anchor="b"/>
           <a:lstStyle>
             <a:lvl1pPr>
-              <a:defRPr sz="3968"/>
+              <a:defRPr sz="5039"/>
             </a:lvl1pPr>
           </a:lstStyle>
           <a:p>
@@ -2220,8 +2218,8 @@
         </p:nvSpPr>
         <p:spPr>
           <a:xfrm>
-            <a:off x="6427693" y="1295767"/>
-            <a:ext cx="7654171" cy="6395505"/>
+            <a:off x="6427693" y="1554968"/>
+            <a:ext cx="7654171" cy="7674832"/>
           </a:xfrm>
         </p:spPr>
         <p:txBody>
@@ -2229,39 +2227,39 @@
           <a:lstStyle>
             <a:lvl1pPr marL="0" indent="0">
               <a:buNone/>
-              <a:defRPr sz="3968"/>
+              <a:defRPr sz="5039"/>
             </a:lvl1pPr>
-            <a:lvl2pPr marL="566974" indent="0">
-              <a:buNone/>
-              <a:defRPr sz="3472"/>
+            <a:lvl2pPr marL="719999" indent="0">
+              <a:buNone/>
+              <a:defRPr sz="4409"/>
             </a:lvl2pPr>
-            <a:lvl3pPr marL="1133947" indent="0">
-              <a:buNone/>
-              <a:defRPr sz="2976"/>
+            <a:lvl3pPr marL="1439997" indent="0">
+              <a:buNone/>
+              <a:defRPr sz="3780"/>
             </a:lvl3pPr>
-            <a:lvl4pPr marL="1700921" indent="0">
-              <a:buNone/>
-              <a:defRPr sz="2480"/>
+            <a:lvl4pPr marL="2159996" indent="0">
+              <a:buNone/>
+              <a:defRPr sz="3150"/>
             </a:lvl4pPr>
-            <a:lvl5pPr marL="2267895" indent="0">
-              <a:buNone/>
-              <a:defRPr sz="2480"/>
+            <a:lvl5pPr marL="2879994" indent="0">
+              <a:buNone/>
+              <a:defRPr sz="3150"/>
             </a:lvl5pPr>
-            <a:lvl6pPr marL="2834869" indent="0">
-              <a:buNone/>
-              <a:defRPr sz="2480"/>
+            <a:lvl6pPr marL="3599993" indent="0">
+              <a:buNone/>
+              <a:defRPr sz="3150"/>
             </a:lvl6pPr>
-            <a:lvl7pPr marL="3401842" indent="0">
-              <a:buNone/>
-              <a:defRPr sz="2480"/>
+            <a:lvl7pPr marL="4319991" indent="0">
+              <a:buNone/>
+              <a:defRPr sz="3150"/>
             </a:lvl7pPr>
-            <a:lvl8pPr marL="3968816" indent="0">
-              <a:buNone/>
-              <a:defRPr sz="2480"/>
+            <a:lvl8pPr marL="5039990" indent="0">
+              <a:buNone/>
+              <a:defRPr sz="3150"/>
             </a:lvl8pPr>
-            <a:lvl9pPr marL="4535790" indent="0">
-              <a:buNone/>
-              <a:defRPr sz="2480"/>
+            <a:lvl9pPr marL="5759988" indent="0">
+              <a:buNone/>
+              <a:defRPr sz="3150"/>
             </a:lvl9pPr>
           </a:lstStyle>
           <a:p>
@@ -2285,8 +2283,8 @@
         </p:nvSpPr>
         <p:spPr>
           <a:xfrm>
-            <a:off x="1041425" y="2699862"/>
-            <a:ext cx="4876383" cy="5001827"/>
+            <a:off x="1041425" y="3239929"/>
+            <a:ext cx="4876384" cy="6002369"/>
           </a:xfrm>
         </p:spPr>
         <p:txBody>
@@ -2294,39 +2292,39 @@
           <a:lstStyle>
             <a:lvl1pPr marL="0" indent="0">
               <a:buNone/>
-              <a:defRPr sz="1984"/>
+              <a:defRPr sz="2520"/>
             </a:lvl1pPr>
-            <a:lvl2pPr marL="566974" indent="0">
-              <a:buNone/>
-              <a:defRPr sz="1736"/>
+            <a:lvl2pPr marL="719999" indent="0">
+              <a:buNone/>
+              <a:defRPr sz="2205"/>
             </a:lvl2pPr>
-            <a:lvl3pPr marL="1133947" indent="0">
-              <a:buNone/>
-              <a:defRPr sz="1488"/>
+            <a:lvl3pPr marL="1439997" indent="0">
+              <a:buNone/>
+              <a:defRPr sz="1890"/>
             </a:lvl3pPr>
-            <a:lvl4pPr marL="1700921" indent="0">
-              <a:buNone/>
-              <a:defRPr sz="1240"/>
+            <a:lvl4pPr marL="2159996" indent="0">
+              <a:buNone/>
+              <a:defRPr sz="1575"/>
             </a:lvl4pPr>
-            <a:lvl5pPr marL="2267895" indent="0">
-              <a:buNone/>
-              <a:defRPr sz="1240"/>
+            <a:lvl5pPr marL="2879994" indent="0">
+              <a:buNone/>
+              <a:defRPr sz="1575"/>
             </a:lvl5pPr>
-            <a:lvl6pPr marL="2834869" indent="0">
-              <a:buNone/>
-              <a:defRPr sz="1240"/>
+            <a:lvl6pPr marL="3599993" indent="0">
+              <a:buNone/>
+              <a:defRPr sz="1575"/>
             </a:lvl6pPr>
-            <a:lvl7pPr marL="3401842" indent="0">
-              <a:buNone/>
-              <a:defRPr sz="1240"/>
+            <a:lvl7pPr marL="4319991" indent="0">
+              <a:buNone/>
+              <a:defRPr sz="1575"/>
             </a:lvl7pPr>
-            <a:lvl8pPr marL="3968816" indent="0">
-              <a:buNone/>
-              <a:defRPr sz="1240"/>
+            <a:lvl8pPr marL="5039990" indent="0">
+              <a:buNone/>
+              <a:defRPr sz="1575"/>
             </a:lvl8pPr>
-            <a:lvl9pPr marL="4535790" indent="0">
-              <a:buNone/>
-              <a:defRPr sz="1240"/>
+            <a:lvl9pPr marL="5759988" indent="0">
+              <a:buNone/>
+              <a:defRPr sz="1575"/>
             </a:lvl9pPr>
           </a:lstStyle>
           <a:p>
@@ -2355,7 +2353,7 @@
           <a:p>
             <a:fld id="{F86A943B-CE53-490B-99DE-9227ACE8B16B}" type="datetimeFigureOut">
               <a:rPr lang="en-GB" smtClean="0"/>
-              <a:t>17/10/2016</a:t>
+              <a:t>21/10/2016</a:t>
             </a:fld>
             <a:endParaRPr lang="en-GB"/>
           </a:p>
@@ -2406,7 +2404,7 @@
     </p:spTree>
     <p:extLst>
       <p:ext uri="{BB962C8B-B14F-4D97-AF65-F5344CB8AC3E}">
-        <p14:creationId xmlns:p14="http://schemas.microsoft.com/office/powerpoint/2010/main" val="2927905636"/>
+        <p14:creationId xmlns:p14="http://schemas.microsoft.com/office/powerpoint/2010/main" val="216497185"/>
       </p:ext>
     </p:extLst>
   </p:cSld>
@@ -2450,8 +2448,8 @@
         </p:nvSpPr>
         <p:spPr>
           <a:xfrm>
-            <a:off x="1039456" y="479143"/>
-            <a:ext cx="13040439" cy="1739495"/>
+            <a:off x="1039456" y="574990"/>
+            <a:ext cx="13040439" cy="2087455"/>
           </a:xfrm>
           <a:prstGeom prst="rect">
             <a:avLst/>
@@ -2483,8 +2481,8 @@
         </p:nvSpPr>
         <p:spPr>
           <a:xfrm>
-            <a:off x="1039456" y="2395710"/>
-            <a:ext cx="13040439" cy="5710124"/>
+            <a:off x="1039456" y="2874937"/>
+            <a:ext cx="13040439" cy="6852350"/>
           </a:xfrm>
           <a:prstGeom prst="rect">
             <a:avLst/>
@@ -2545,8 +2543,8 @@
         </p:nvSpPr>
         <p:spPr>
           <a:xfrm>
-            <a:off x="1039455" y="8341239"/>
-            <a:ext cx="3401854" cy="479142"/>
+            <a:off x="1039455" y="10009783"/>
+            <a:ext cx="3401854" cy="574987"/>
           </a:xfrm>
           <a:prstGeom prst="rect">
             <a:avLst/>
@@ -2556,7 +2554,7 @@
           <a:bodyPr vert="horz" lIns="91440" tIns="45720" rIns="91440" bIns="45720" rtlCol="0" anchor="ctr"/>
           <a:lstStyle>
             <a:lvl1pPr algn="l">
-              <a:defRPr sz="1488">
+              <a:defRPr sz="1890">
                 <a:solidFill>
                   <a:schemeClr val="tx1">
                     <a:tint val="75000"/>
@@ -2568,7 +2566,7 @@
           <a:p>
             <a:fld id="{F86A943B-CE53-490B-99DE-9227ACE8B16B}" type="datetimeFigureOut">
               <a:rPr lang="en-GB" smtClean="0"/>
-              <a:t>17/10/2016</a:t>
+              <a:t>21/10/2016</a:t>
             </a:fld>
             <a:endParaRPr lang="en-GB"/>
           </a:p>
@@ -2586,8 +2584,8 @@
         </p:nvSpPr>
         <p:spPr>
           <a:xfrm>
-            <a:off x="5008285" y="8341239"/>
-            <a:ext cx="5102781" cy="479142"/>
+            <a:off x="5008285" y="10009783"/>
+            <a:ext cx="5102781" cy="574987"/>
           </a:xfrm>
           <a:prstGeom prst="rect">
             <a:avLst/>
@@ -2597,7 +2595,7 @@
           <a:bodyPr vert="horz" lIns="91440" tIns="45720" rIns="91440" bIns="45720" rtlCol="0" anchor="ctr"/>
           <a:lstStyle>
             <a:lvl1pPr algn="ctr">
-              <a:defRPr sz="1488">
+              <a:defRPr sz="1890">
                 <a:solidFill>
                   <a:schemeClr val="tx1">
                     <a:tint val="75000"/>
@@ -2623,8 +2621,8 @@
         </p:nvSpPr>
         <p:spPr>
           <a:xfrm>
-            <a:off x="10678041" y="8341239"/>
-            <a:ext cx="3401854" cy="479142"/>
+            <a:off x="10678041" y="10009783"/>
+            <a:ext cx="3401854" cy="574987"/>
           </a:xfrm>
           <a:prstGeom prst="rect">
             <a:avLst/>
@@ -2634,7 +2632,7 @@
           <a:bodyPr vert="horz" lIns="91440" tIns="45720" rIns="91440" bIns="45720" rtlCol="0" anchor="ctr"/>
           <a:lstStyle>
             <a:lvl1pPr algn="r">
-              <a:defRPr sz="1488">
+              <a:defRPr sz="1890">
                 <a:solidFill>
                   <a:schemeClr val="tx1">
                     <a:tint val="75000"/>
@@ -2655,27 +2653,27 @@
     </p:spTree>
     <p:extLst>
       <p:ext uri="{BB962C8B-B14F-4D97-AF65-F5344CB8AC3E}">
-        <p14:creationId xmlns:p14="http://schemas.microsoft.com/office/powerpoint/2010/main" val="3062760984"/>
+        <p14:creationId xmlns:p14="http://schemas.microsoft.com/office/powerpoint/2010/main" val="1120511046"/>
       </p:ext>
     </p:extLst>
   </p:cSld>
   <p:clrMap bg1="lt1" tx1="dk1" bg2="lt2" tx2="dk2" accent1="accent1" accent2="accent2" accent3="accent3" accent4="accent4" accent5="accent5" accent6="accent6" hlink="hlink" folHlink="folHlink"/>
   <p:sldLayoutIdLst>
-    <p:sldLayoutId id="2147483685" r:id="rId1"/>
-    <p:sldLayoutId id="2147483686" r:id="rId2"/>
-    <p:sldLayoutId id="2147483687" r:id="rId3"/>
-    <p:sldLayoutId id="2147483688" r:id="rId4"/>
-    <p:sldLayoutId id="2147483689" r:id="rId5"/>
-    <p:sldLayoutId id="2147483690" r:id="rId6"/>
-    <p:sldLayoutId id="2147483691" r:id="rId7"/>
-    <p:sldLayoutId id="2147483692" r:id="rId8"/>
-    <p:sldLayoutId id="2147483693" r:id="rId9"/>
-    <p:sldLayoutId id="2147483694" r:id="rId10"/>
-    <p:sldLayoutId id="2147483695" r:id="rId11"/>
+    <p:sldLayoutId id="2147483697" r:id="rId1"/>
+    <p:sldLayoutId id="2147483698" r:id="rId2"/>
+    <p:sldLayoutId id="2147483699" r:id="rId3"/>
+    <p:sldLayoutId id="2147483700" r:id="rId4"/>
+    <p:sldLayoutId id="2147483701" r:id="rId5"/>
+    <p:sldLayoutId id="2147483702" r:id="rId6"/>
+    <p:sldLayoutId id="2147483703" r:id="rId7"/>
+    <p:sldLayoutId id="2147483704" r:id="rId8"/>
+    <p:sldLayoutId id="2147483705" r:id="rId9"/>
+    <p:sldLayoutId id="2147483706" r:id="rId10"/>
+    <p:sldLayoutId id="2147483707" r:id="rId11"/>
   </p:sldLayoutIdLst>
   <p:txStyles>
     <p:titleStyle>
-      <a:lvl1pPr algn="l" defTabSz="1133947" rtl="0" eaLnBrk="1" latinLnBrk="0" hangingPunct="1">
+      <a:lvl1pPr algn="l" defTabSz="1439997" rtl="0" eaLnBrk="1" latinLnBrk="0" hangingPunct="1">
         <a:lnSpc>
           <a:spcPct val="90000"/>
         </a:lnSpc>
@@ -2683,7 +2681,7 @@
           <a:spcPct val="0"/>
         </a:spcBef>
         <a:buNone/>
-        <a:defRPr sz="5456" kern="1200">
+        <a:defRPr sz="6929" kern="1200">
           <a:solidFill>
             <a:schemeClr val="tx1"/>
           </a:solidFill>
@@ -2694,16 +2692,16 @@
       </a:lvl1pPr>
     </p:titleStyle>
     <p:bodyStyle>
-      <a:lvl1pPr marL="283487" indent="-283487" algn="l" defTabSz="1133947" rtl="0" eaLnBrk="1" latinLnBrk="0" hangingPunct="1">
+      <a:lvl1pPr marL="359999" indent="-359999" algn="l" defTabSz="1439997" rtl="0" eaLnBrk="1" latinLnBrk="0" hangingPunct="1">
         <a:lnSpc>
           <a:spcPct val="90000"/>
         </a:lnSpc>
         <a:spcBef>
-          <a:spcPts val="1240"/>
+          <a:spcPts val="1575"/>
         </a:spcBef>
         <a:buFont typeface="Arial" panose="020B0604020202020204" pitchFamily="34" charset="0"/>
         <a:buChar char="•"/>
-        <a:defRPr sz="3472" kern="1200">
+        <a:defRPr sz="4409" kern="1200">
           <a:solidFill>
             <a:schemeClr val="tx1"/>
           </a:solidFill>
@@ -2712,16 +2710,16 @@
           <a:cs typeface="+mn-cs"/>
         </a:defRPr>
       </a:lvl1pPr>
-      <a:lvl2pPr marL="850461" indent="-283487" algn="l" defTabSz="1133947" rtl="0" eaLnBrk="1" latinLnBrk="0" hangingPunct="1">
+      <a:lvl2pPr marL="1079998" indent="-359999" algn="l" defTabSz="1439997" rtl="0" eaLnBrk="1" latinLnBrk="0" hangingPunct="1">
         <a:lnSpc>
           <a:spcPct val="90000"/>
         </a:lnSpc>
         <a:spcBef>
-          <a:spcPts val="620"/>
+          <a:spcPts val="787"/>
         </a:spcBef>
         <a:buFont typeface="Arial" panose="020B0604020202020204" pitchFamily="34" charset="0"/>
         <a:buChar char="•"/>
-        <a:defRPr sz="2976" kern="1200">
+        <a:defRPr sz="3780" kern="1200">
           <a:solidFill>
             <a:schemeClr val="tx1"/>
           </a:solidFill>
@@ -2730,16 +2728,16 @@
           <a:cs typeface="+mn-cs"/>
         </a:defRPr>
       </a:lvl2pPr>
-      <a:lvl3pPr marL="1417434" indent="-283487" algn="l" defTabSz="1133947" rtl="0" eaLnBrk="1" latinLnBrk="0" hangingPunct="1">
+      <a:lvl3pPr marL="1799996" indent="-359999" algn="l" defTabSz="1439997" rtl="0" eaLnBrk="1" latinLnBrk="0" hangingPunct="1">
         <a:lnSpc>
           <a:spcPct val="90000"/>
         </a:lnSpc>
         <a:spcBef>
-          <a:spcPts val="620"/>
+          <a:spcPts val="787"/>
         </a:spcBef>
         <a:buFont typeface="Arial" panose="020B0604020202020204" pitchFamily="34" charset="0"/>
         <a:buChar char="•"/>
-        <a:defRPr sz="2480" kern="1200">
+        <a:defRPr sz="3150" kern="1200">
           <a:solidFill>
             <a:schemeClr val="tx1"/>
           </a:solidFill>
@@ -2748,16 +2746,16 @@
           <a:cs typeface="+mn-cs"/>
         </a:defRPr>
       </a:lvl3pPr>
-      <a:lvl4pPr marL="1984408" indent="-283487" algn="l" defTabSz="1133947" rtl="0" eaLnBrk="1" latinLnBrk="0" hangingPunct="1">
+      <a:lvl4pPr marL="2519995" indent="-359999" algn="l" defTabSz="1439997" rtl="0" eaLnBrk="1" latinLnBrk="0" hangingPunct="1">
         <a:lnSpc>
           <a:spcPct val="90000"/>
         </a:lnSpc>
         <a:spcBef>
-          <a:spcPts val="620"/>
+          <a:spcPts val="787"/>
         </a:spcBef>
         <a:buFont typeface="Arial" panose="020B0604020202020204" pitchFamily="34" charset="0"/>
         <a:buChar char="•"/>
-        <a:defRPr sz="2232" kern="1200">
+        <a:defRPr sz="2835" kern="1200">
           <a:solidFill>
             <a:schemeClr val="tx1"/>
           </a:solidFill>
@@ -2766,16 +2764,16 @@
           <a:cs typeface="+mn-cs"/>
         </a:defRPr>
       </a:lvl4pPr>
-      <a:lvl5pPr marL="2551382" indent="-283487" algn="l" defTabSz="1133947" rtl="0" eaLnBrk="1" latinLnBrk="0" hangingPunct="1">
+      <a:lvl5pPr marL="3239994" indent="-359999" algn="l" defTabSz="1439997" rtl="0" eaLnBrk="1" latinLnBrk="0" hangingPunct="1">
         <a:lnSpc>
           <a:spcPct val="90000"/>
         </a:lnSpc>
         <a:spcBef>
-          <a:spcPts val="620"/>
+          <a:spcPts val="787"/>
         </a:spcBef>
         <a:buFont typeface="Arial" panose="020B0604020202020204" pitchFamily="34" charset="0"/>
         <a:buChar char="•"/>
-        <a:defRPr sz="2232" kern="1200">
+        <a:defRPr sz="2835" kern="1200">
           <a:solidFill>
             <a:schemeClr val="tx1"/>
           </a:solidFill>
@@ -2784,16 +2782,16 @@
           <a:cs typeface="+mn-cs"/>
         </a:defRPr>
       </a:lvl5pPr>
-      <a:lvl6pPr marL="3118355" indent="-283487" algn="l" defTabSz="1133947" rtl="0" eaLnBrk="1" latinLnBrk="0" hangingPunct="1">
+      <a:lvl6pPr marL="3959992" indent="-359999" algn="l" defTabSz="1439997" rtl="0" eaLnBrk="1" latinLnBrk="0" hangingPunct="1">
         <a:lnSpc>
           <a:spcPct val="90000"/>
         </a:lnSpc>
         <a:spcBef>
-          <a:spcPts val="620"/>
+          <a:spcPts val="787"/>
         </a:spcBef>
         <a:buFont typeface="Arial" panose="020B0604020202020204" pitchFamily="34" charset="0"/>
         <a:buChar char="•"/>
-        <a:defRPr sz="2232" kern="1200">
+        <a:defRPr sz="2835" kern="1200">
           <a:solidFill>
             <a:schemeClr val="tx1"/>
           </a:solidFill>
@@ -2802,16 +2800,16 @@
           <a:cs typeface="+mn-cs"/>
         </a:defRPr>
       </a:lvl6pPr>
-      <a:lvl7pPr marL="3685329" indent="-283487" algn="l" defTabSz="1133947" rtl="0" eaLnBrk="1" latinLnBrk="0" hangingPunct="1">
+      <a:lvl7pPr marL="4679991" indent="-359999" algn="l" defTabSz="1439997" rtl="0" eaLnBrk="1" latinLnBrk="0" hangingPunct="1">
         <a:lnSpc>
           <a:spcPct val="90000"/>
         </a:lnSpc>
         <a:spcBef>
-          <a:spcPts val="620"/>
+          <a:spcPts val="787"/>
         </a:spcBef>
         <a:buFont typeface="Arial" panose="020B0604020202020204" pitchFamily="34" charset="0"/>
         <a:buChar char="•"/>
-        <a:defRPr sz="2232" kern="1200">
+        <a:defRPr sz="2835" kern="1200">
           <a:solidFill>
             <a:schemeClr val="tx1"/>
           </a:solidFill>
@@ -2820,16 +2818,16 @@
           <a:cs typeface="+mn-cs"/>
         </a:defRPr>
       </a:lvl7pPr>
-      <a:lvl8pPr marL="4252303" indent="-283487" algn="l" defTabSz="1133947" rtl="0" eaLnBrk="1" latinLnBrk="0" hangingPunct="1">
+      <a:lvl8pPr marL="5399989" indent="-359999" algn="l" defTabSz="1439997" rtl="0" eaLnBrk="1" latinLnBrk="0" hangingPunct="1">
         <a:lnSpc>
           <a:spcPct val="90000"/>
         </a:lnSpc>
         <a:spcBef>
-          <a:spcPts val="620"/>
+          <a:spcPts val="787"/>
         </a:spcBef>
         <a:buFont typeface="Arial" panose="020B0604020202020204" pitchFamily="34" charset="0"/>
         <a:buChar char="•"/>
-        <a:defRPr sz="2232" kern="1200">
+        <a:defRPr sz="2835" kern="1200">
           <a:solidFill>
             <a:schemeClr val="tx1"/>
           </a:solidFill>
@@ -2838,16 +2836,16 @@
           <a:cs typeface="+mn-cs"/>
         </a:defRPr>
       </a:lvl8pPr>
-      <a:lvl9pPr marL="4819277" indent="-283487" algn="l" defTabSz="1133947" rtl="0" eaLnBrk="1" latinLnBrk="0" hangingPunct="1">
+      <a:lvl9pPr marL="6119988" indent="-359999" algn="l" defTabSz="1439997" rtl="0" eaLnBrk="1" latinLnBrk="0" hangingPunct="1">
         <a:lnSpc>
           <a:spcPct val="90000"/>
         </a:lnSpc>
         <a:spcBef>
-          <a:spcPts val="620"/>
+          <a:spcPts val="787"/>
         </a:spcBef>
         <a:buFont typeface="Arial" panose="020B0604020202020204" pitchFamily="34" charset="0"/>
         <a:buChar char="•"/>
-        <a:defRPr sz="2232" kern="1200">
+        <a:defRPr sz="2835" kern="1200">
           <a:solidFill>
             <a:schemeClr val="tx1"/>
           </a:solidFill>
@@ -2861,8 +2859,8 @@
       <a:defPPr>
         <a:defRPr lang="en-US"/>
       </a:defPPr>
-      <a:lvl1pPr marL="0" algn="l" defTabSz="1133947" rtl="0" eaLnBrk="1" latinLnBrk="0" hangingPunct="1">
-        <a:defRPr sz="2232" kern="1200">
+      <a:lvl1pPr marL="0" algn="l" defTabSz="1439997" rtl="0" eaLnBrk="1" latinLnBrk="0" hangingPunct="1">
+        <a:defRPr sz="2835" kern="1200">
           <a:solidFill>
             <a:schemeClr val="tx1"/>
           </a:solidFill>
@@ -2871,8 +2869,8 @@
           <a:cs typeface="+mn-cs"/>
         </a:defRPr>
       </a:lvl1pPr>
-      <a:lvl2pPr marL="566974" algn="l" defTabSz="1133947" rtl="0" eaLnBrk="1" latinLnBrk="0" hangingPunct="1">
-        <a:defRPr sz="2232" kern="1200">
+      <a:lvl2pPr marL="719999" algn="l" defTabSz="1439997" rtl="0" eaLnBrk="1" latinLnBrk="0" hangingPunct="1">
+        <a:defRPr sz="2835" kern="1200">
           <a:solidFill>
             <a:schemeClr val="tx1"/>
           </a:solidFill>
@@ -2881,8 +2879,8 @@
           <a:cs typeface="+mn-cs"/>
         </a:defRPr>
       </a:lvl2pPr>
-      <a:lvl3pPr marL="1133947" algn="l" defTabSz="1133947" rtl="0" eaLnBrk="1" latinLnBrk="0" hangingPunct="1">
-        <a:defRPr sz="2232" kern="1200">
+      <a:lvl3pPr marL="1439997" algn="l" defTabSz="1439997" rtl="0" eaLnBrk="1" latinLnBrk="0" hangingPunct="1">
+        <a:defRPr sz="2835" kern="1200">
           <a:solidFill>
             <a:schemeClr val="tx1"/>
           </a:solidFill>
@@ -2891,8 +2889,8 @@
           <a:cs typeface="+mn-cs"/>
         </a:defRPr>
       </a:lvl3pPr>
-      <a:lvl4pPr marL="1700921" algn="l" defTabSz="1133947" rtl="0" eaLnBrk="1" latinLnBrk="0" hangingPunct="1">
-        <a:defRPr sz="2232" kern="1200">
+      <a:lvl4pPr marL="2159996" algn="l" defTabSz="1439997" rtl="0" eaLnBrk="1" latinLnBrk="0" hangingPunct="1">
+        <a:defRPr sz="2835" kern="1200">
           <a:solidFill>
             <a:schemeClr val="tx1"/>
           </a:solidFill>
@@ -2901,8 +2899,8 @@
           <a:cs typeface="+mn-cs"/>
         </a:defRPr>
       </a:lvl4pPr>
-      <a:lvl5pPr marL="2267895" algn="l" defTabSz="1133947" rtl="0" eaLnBrk="1" latinLnBrk="0" hangingPunct="1">
-        <a:defRPr sz="2232" kern="1200">
+      <a:lvl5pPr marL="2879994" algn="l" defTabSz="1439997" rtl="0" eaLnBrk="1" latinLnBrk="0" hangingPunct="1">
+        <a:defRPr sz="2835" kern="1200">
           <a:solidFill>
             <a:schemeClr val="tx1"/>
           </a:solidFill>
@@ -2911,8 +2909,8 @@
           <a:cs typeface="+mn-cs"/>
         </a:defRPr>
       </a:lvl5pPr>
-      <a:lvl6pPr marL="2834869" algn="l" defTabSz="1133947" rtl="0" eaLnBrk="1" latinLnBrk="0" hangingPunct="1">
-        <a:defRPr sz="2232" kern="1200">
+      <a:lvl6pPr marL="3599993" algn="l" defTabSz="1439997" rtl="0" eaLnBrk="1" latinLnBrk="0" hangingPunct="1">
+        <a:defRPr sz="2835" kern="1200">
           <a:solidFill>
             <a:schemeClr val="tx1"/>
           </a:solidFill>
@@ -2921,8 +2919,8 @@
           <a:cs typeface="+mn-cs"/>
         </a:defRPr>
       </a:lvl6pPr>
-      <a:lvl7pPr marL="3401842" algn="l" defTabSz="1133947" rtl="0" eaLnBrk="1" latinLnBrk="0" hangingPunct="1">
-        <a:defRPr sz="2232" kern="1200">
+      <a:lvl7pPr marL="4319991" algn="l" defTabSz="1439997" rtl="0" eaLnBrk="1" latinLnBrk="0" hangingPunct="1">
+        <a:defRPr sz="2835" kern="1200">
           <a:solidFill>
             <a:schemeClr val="tx1"/>
           </a:solidFill>
@@ -2931,8 +2929,8 @@
           <a:cs typeface="+mn-cs"/>
         </a:defRPr>
       </a:lvl7pPr>
-      <a:lvl8pPr marL="3968816" algn="l" defTabSz="1133947" rtl="0" eaLnBrk="1" latinLnBrk="0" hangingPunct="1">
-        <a:defRPr sz="2232" kern="1200">
+      <a:lvl8pPr marL="5039990" algn="l" defTabSz="1439997" rtl="0" eaLnBrk="1" latinLnBrk="0" hangingPunct="1">
+        <a:defRPr sz="2835" kern="1200">
           <a:solidFill>
             <a:schemeClr val="tx1"/>
           </a:solidFill>
@@ -2941,8 +2939,8 @@
           <a:cs typeface="+mn-cs"/>
         </a:defRPr>
       </a:lvl8pPr>
-      <a:lvl9pPr marL="4535790" algn="l" defTabSz="1133947" rtl="0" eaLnBrk="1" latinLnBrk="0" hangingPunct="1">
-        <a:defRPr sz="2232" kern="1200">
+      <a:lvl9pPr marL="5759988" algn="l" defTabSz="1439997" rtl="0" eaLnBrk="1" latinLnBrk="0" hangingPunct="1">
+        <a:defRPr sz="2835" kern="1200">
           <a:solidFill>
             <a:schemeClr val="tx1"/>
           </a:solidFill>
@@ -2985,20 +2983,26 @@
         </p:nvSpPr>
         <p:spPr>
           <a:xfrm>
-            <a:off x="726601" y="132194"/>
-            <a:ext cx="13673251" cy="1031166"/>
-          </a:xfrm>
-        </p:spPr>
-        <p:txBody>
-          <a:bodyPr/>
+            <a:off x="184732" y="255522"/>
+            <a:ext cx="14220949" cy="1031166"/>
+          </a:xfrm>
+        </p:spPr>
+        <p:txBody>
+          <a:bodyPr>
+            <a:normAutofit/>
+          </a:bodyPr>
           <a:lstStyle/>
           <a:p>
             <a:pPr algn="ctr"/>
             <a:r>
-              <a:rPr lang="en-GB" dirty="0" smtClean="0"/>
-              <a:t>Advanced Search - System Sequence Diagram</a:t>
-            </a:r>
-            <a:endParaRPr lang="en-GB" dirty="0"/>
+              <a:rPr lang="en-GB" sz="4000" b="1" u="sng" dirty="0" smtClean="0"/>
+              <a:t>Advanced Search </a:t>
+            </a:r>
+            <a:r>
+              <a:rPr lang="en-GB" sz="4000" b="1" u="sng" dirty="0" smtClean="0"/>
+              <a:t>Scenario</a:t>
+            </a:r>
+            <a:endParaRPr lang="en-GB" sz="4000" b="1" u="sng" dirty="0"/>
           </a:p>
         </p:txBody>
       </p:sp>
@@ -3010,12 +3014,15 @@
         </p:nvSpPr>
         <p:spPr>
           <a:xfrm>
-            <a:off x="1916494" y="1454367"/>
-            <a:ext cx="3100389" cy="742950"/>
+            <a:off x="1649894" y="3249001"/>
+            <a:ext cx="3440337" cy="742950"/>
           </a:xfrm>
           <a:prstGeom prst="rect">
             <a:avLst/>
           </a:prstGeom>
+          <a:ln>
+            <a:noFill/>
+          </a:ln>
         </p:spPr>
         <p:style>
           <a:lnRef idx="2">
@@ -3042,12 +3049,8 @@
           <a:p>
             <a:pPr algn="ctr"/>
             <a:r>
-              <a:rPr lang="en-GB" sz="1800" dirty="0"/>
-              <a:t>University student (User</a:t>
-            </a:r>
-            <a:r>
-              <a:rPr lang="en-GB" sz="1800" dirty="0"/>
-              <a:t>)</a:t>
+              <a:rPr lang="en-GB" sz="2400" dirty="0"/>
+              <a:t>University student (User)</a:t>
             </a:r>
           </a:p>
         </p:txBody>
@@ -3060,7 +3063,7 @@
         </p:nvSpPr>
         <p:spPr>
           <a:xfrm>
-            <a:off x="10379731" y="1454367"/>
+            <a:off x="10379732" y="3249001"/>
             <a:ext cx="1628775" cy="742950"/>
           </a:xfrm>
           <a:prstGeom prst="rect">
@@ -3092,9 +3095,10 @@
           <a:p>
             <a:pPr algn="ctr"/>
             <a:r>
-              <a:rPr lang="en-GB" sz="1800" dirty="0"/>
-              <a:t>System</a:t>
-            </a:r>
+              <a:rPr lang="en-GB" sz="2400" dirty="0" smtClean="0"/>
+              <a:t>:System</a:t>
+            </a:r>
+            <a:endParaRPr lang="en-GB" sz="2400" dirty="0"/>
           </a:p>
         </p:txBody>
       </p:sp>
@@ -3108,8 +3112,8 @@
         </p:nvCxnSpPr>
         <p:spPr>
           <a:xfrm>
-            <a:off x="3466689" y="2197317"/>
-            <a:ext cx="0" cy="6802221"/>
+            <a:off x="3370063" y="3991951"/>
+            <a:ext cx="18273" cy="6802222"/>
           </a:xfrm>
           <a:prstGeom prst="line">
             <a:avLst/>
@@ -3143,7 +3147,7 @@
         </p:nvCxnSpPr>
         <p:spPr>
           <a:xfrm>
-            <a:off x="11194119" y="2197317"/>
+            <a:off x="11194119" y="3991952"/>
             <a:ext cx="0" cy="6802221"/>
           </a:xfrm>
           <a:prstGeom prst="line">
@@ -3176,7 +3180,7 @@
         </p:nvSpPr>
         <p:spPr>
           <a:xfrm>
-            <a:off x="5622113" y="2538460"/>
+            <a:off x="5622113" y="4333094"/>
             <a:ext cx="3421064" cy="369332"/>
           </a:xfrm>
           <a:prstGeom prst="rect">
@@ -3192,9 +3196,10 @@
           <a:p>
             <a:pPr algn="ctr"/>
             <a:r>
-              <a:rPr lang="en-GB" sz="1800" dirty="0"/>
-              <a:t>Searching</a:t>
-            </a:r>
+              <a:rPr lang="en-GB" sz="1800" dirty="0" err="1" smtClean="0"/>
+              <a:t>SearchInitialisation</a:t>
+            </a:r>
+            <a:endParaRPr lang="en-GB" sz="1800" dirty="0"/>
           </a:p>
         </p:txBody>
       </p:sp>
@@ -3206,7 +3211,7 @@
         </p:nvSpPr>
         <p:spPr>
           <a:xfrm>
-            <a:off x="5326607" y="6180806"/>
+            <a:off x="5326607" y="7975440"/>
             <a:ext cx="3937200" cy="369332"/>
           </a:xfrm>
           <a:prstGeom prst="rect">
@@ -3222,8 +3227,8 @@
           <a:p>
             <a:pPr algn="ctr"/>
             <a:r>
-              <a:rPr lang="en-GB" sz="1800" dirty="0" err="1"/>
-              <a:t>show_suggestions</a:t>
+              <a:rPr lang="en-GB" sz="1800" dirty="0" err="1" smtClean="0"/>
+              <a:t>ShowSuggestions</a:t>
             </a:r>
             <a:endParaRPr lang="en-GB" sz="1800" dirty="0"/>
           </a:p>
@@ -3237,7 +3242,7 @@
         </p:nvSpPr>
         <p:spPr>
           <a:xfrm>
-            <a:off x="5269636" y="5602148"/>
+            <a:off x="5269636" y="7396782"/>
             <a:ext cx="4118874" cy="369332"/>
           </a:xfrm>
           <a:prstGeom prst="rect">
@@ -3253,8 +3258,8 @@
           <a:p>
             <a:pPr algn="ctr"/>
             <a:r>
-              <a:rPr lang="en-GB" sz="1800" dirty="0" err="1"/>
-              <a:t>get_suggestions</a:t>
+              <a:rPr lang="en-GB" sz="1800" dirty="0" smtClean="0"/>
+              <a:t>Typing</a:t>
             </a:r>
             <a:endParaRPr lang="en-GB" sz="1800" dirty="0"/>
           </a:p>
@@ -3268,11 +3273,13 @@
         </p:nvSpPr>
         <p:spPr>
           <a:xfrm>
-            <a:off x="2153562" y="5492880"/>
+            <a:off x="2153563" y="7287515"/>
             <a:ext cx="9592733" cy="1299361"/>
           </a:xfrm>
           <a:prstGeom prst="roundRect">
-            <a:avLst/>
+            <a:avLst>
+              <a:gd name="adj" fmla="val 0"/>
+            </a:avLst>
           </a:prstGeom>
           <a:noFill/>
           <a:ln w="19050">
@@ -3321,7 +3328,7 @@
         </p:nvSpPr>
         <p:spPr>
           <a:xfrm>
-            <a:off x="2272805" y="5571059"/>
+            <a:off x="2173416" y="7306059"/>
             <a:ext cx="1067385" cy="299236"/>
           </a:xfrm>
           <a:prstGeom prst="roundRect">
@@ -3367,13 +3374,16 @@
         </p:nvCxnSpPr>
         <p:spPr>
           <a:xfrm>
-            <a:off x="3493414" y="7536513"/>
+            <a:off x="3493414" y="9331147"/>
             <a:ext cx="7632124" cy="0"/>
           </a:xfrm>
           <a:prstGeom prst="straightConnector1">
             <a:avLst/>
           </a:prstGeom>
-          <a:ln w="57150">
+          <a:ln w="38100">
+            <a:solidFill>
+              <a:schemeClr val="tx1"/>
+            </a:solidFill>
             <a:tailEnd type="triangle"/>
           </a:ln>
         </p:spPr>
@@ -3400,7 +3410,7 @@
         </p:nvSpPr>
         <p:spPr>
           <a:xfrm>
-            <a:off x="5054798" y="7078272"/>
+            <a:off x="5054799" y="8872906"/>
             <a:ext cx="4548553" cy="369332"/>
           </a:xfrm>
           <a:prstGeom prst="rect">
@@ -3416,8 +3426,8 @@
           <a:p>
             <a:pPr algn="ctr"/>
             <a:r>
-              <a:rPr lang="en-GB" sz="1800" dirty="0" err="1"/>
-              <a:t>submit_search_query</a:t>
+              <a:rPr lang="en-GB" sz="1800" dirty="0" err="1" smtClean="0"/>
+              <a:t>SubmitSearchQuery</a:t>
             </a:r>
             <a:endParaRPr lang="en-GB" sz="1800" dirty="0"/>
           </a:p>
@@ -3431,13 +3441,16 @@
         </p:nvCxnSpPr>
         <p:spPr>
           <a:xfrm>
-            <a:off x="3480706" y="8161987"/>
+            <a:off x="3480706" y="9956622"/>
             <a:ext cx="7644832" cy="17893"/>
           </a:xfrm>
           <a:prstGeom prst="straightConnector1">
             <a:avLst/>
           </a:prstGeom>
-          <a:ln w="57150">
+          <a:ln w="38100">
+            <a:solidFill>
+              <a:schemeClr val="tx1"/>
+            </a:solidFill>
             <a:headEnd type="triangle" w="med" len="med"/>
             <a:tailEnd type="none" w="med" len="med"/>
           </a:ln>
@@ -3465,7 +3478,7 @@
         </p:nvSpPr>
         <p:spPr>
           <a:xfrm>
-            <a:off x="4027154" y="7755594"/>
+            <a:off x="4027154" y="9550228"/>
             <a:ext cx="6657628" cy="369332"/>
           </a:xfrm>
           <a:prstGeom prst="rect">
@@ -3481,8 +3494,8 @@
           <a:p>
             <a:pPr algn="ctr"/>
             <a:r>
-              <a:rPr lang="en-GB" sz="1800" dirty="0" err="1"/>
-              <a:t>show_results</a:t>
+              <a:rPr lang="en-GB" sz="1800" dirty="0" err="1" smtClean="0"/>
+              <a:t>ShowResults</a:t>
             </a:r>
             <a:endParaRPr lang="en-GB" sz="1800" dirty="0"/>
           </a:p>
@@ -3496,13 +3509,16 @@
         </p:nvCxnSpPr>
         <p:spPr>
           <a:xfrm>
-            <a:off x="3514575" y="6587194"/>
+            <a:off x="3514576" y="8381828"/>
             <a:ext cx="7610963" cy="17814"/>
           </a:xfrm>
           <a:prstGeom prst="straightConnector1">
             <a:avLst/>
           </a:prstGeom>
-          <a:ln w="57150">
+          <a:ln w="38100">
+            <a:solidFill>
+              <a:schemeClr val="tx1"/>
+            </a:solidFill>
             <a:headEnd type="triangle" w="med" len="med"/>
             <a:tailEnd type="none" w="med" len="med"/>
           </a:ln>
@@ -3530,13 +3546,16 @@
         </p:nvCxnSpPr>
         <p:spPr>
           <a:xfrm>
-            <a:off x="3493417" y="5995580"/>
+            <a:off x="3453662" y="7790214"/>
             <a:ext cx="7632121" cy="0"/>
           </a:xfrm>
           <a:prstGeom prst="straightConnector1">
             <a:avLst/>
           </a:prstGeom>
-          <a:ln w="57150">
+          <a:ln w="38100">
+            <a:solidFill>
+              <a:schemeClr val="tx1"/>
+            </a:solidFill>
             <a:tailEnd type="triangle"/>
           </a:ln>
         </p:spPr>
@@ -3563,13 +3582,16 @@
         </p:nvCxnSpPr>
         <p:spPr>
           <a:xfrm>
-            <a:off x="3493420" y="3014984"/>
+            <a:off x="3493420" y="4809618"/>
             <a:ext cx="7632118" cy="0"/>
           </a:xfrm>
           <a:prstGeom prst="straightConnector1">
             <a:avLst/>
           </a:prstGeom>
-          <a:ln w="57150">
+          <a:ln w="38100">
+            <a:solidFill>
+              <a:schemeClr val="tx1"/>
+            </a:solidFill>
             <a:tailEnd type="triangle"/>
           </a:ln>
         </p:spPr>
@@ -3590,33 +3612,20 @@
       </p:cxnSp>
       <p:sp>
         <p:nvSpPr>
-          <p:cNvPr id="33" name="TextBox 32"/>
+          <p:cNvPr id="38" name="TextBox 37"/>
           <p:cNvSpPr txBox="1"/>
           <p:nvPr/>
         </p:nvSpPr>
         <p:spPr>
           <a:xfrm>
-            <a:off x="560977" y="2525757"/>
-            <a:ext cx="2191234" cy="646331"/>
+            <a:off x="5595381" y="5160119"/>
+            <a:ext cx="3421064" cy="369332"/>
           </a:xfrm>
           <a:prstGeom prst="rect">
             <a:avLst/>
           </a:prstGeom>
-        </p:spPr>
-        <p:style>
-          <a:lnRef idx="2">
-            <a:schemeClr val="dk1"/>
-          </a:lnRef>
-          <a:fillRef idx="1">
-            <a:schemeClr val="lt1"/>
-          </a:fillRef>
-          <a:effectRef idx="0">
-            <a:schemeClr val="dk1"/>
-          </a:effectRef>
-          <a:fontRef idx="minor">
-            <a:schemeClr val="dk1"/>
-          </a:fontRef>
-        </p:style>
+          <a:noFill/>
+        </p:spPr>
         <p:txBody>
           <a:bodyPr wrap="square" rtlCol="0">
             <a:spAutoFit/>
@@ -3625,35 +3634,130 @@
           <a:p>
             <a:pPr algn="ctr"/>
             <a:r>
-              <a:rPr lang="en-GB" sz="1800" dirty="0"/>
-              <a:t>Click on the Search input field</a:t>
-            </a:r>
+              <a:rPr lang="en-GB" sz="1800" dirty="0" err="1" smtClean="0"/>
+              <a:t>SetDateFilter</a:t>
+            </a:r>
+            <a:endParaRPr lang="en-GB" sz="1800" dirty="0"/>
           </a:p>
         </p:txBody>
       </p:sp>
       <p:cxnSp>
         <p:nvCxnSpPr>
-          <p:cNvPr id="35" name="Curved Connector 34"/>
-          <p:cNvCxnSpPr>
-            <a:stCxn id="33" idx="3"/>
-            <a:endCxn id="14" idx="1"/>
-          </p:cNvCxnSpPr>
+          <p:cNvPr id="39" name="Straight Arrow Connector 38"/>
+          <p:cNvCxnSpPr/>
           <p:nvPr/>
         </p:nvCxnSpPr>
         <p:spPr>
-          <a:xfrm flipV="1">
-            <a:off x="2752211" y="2723126"/>
-            <a:ext cx="2869902" cy="125797"/>
-          </a:xfrm>
-          <a:prstGeom prst="curvedConnector3">
-            <a:avLst>
-              <a:gd name="adj1" fmla="val 50000"/>
-            </a:avLst>
+          <a:xfrm>
+            <a:off x="3500978" y="5636643"/>
+            <a:ext cx="7632118" cy="0"/>
+          </a:xfrm>
+          <a:prstGeom prst="straightConnector1">
+            <a:avLst/>
           </a:prstGeom>
-          <a:ln w="28575">
-            <a:headEnd type="none" w="med" len="med"/>
-            <a:tailEnd type="triangle" w="med" len="med"/>
+          <a:ln w="38100">
+            <a:solidFill>
+              <a:schemeClr val="tx1"/>
+            </a:solidFill>
+            <a:tailEnd type="triangle"/>
           </a:ln>
+        </p:spPr>
+        <p:style>
+          <a:lnRef idx="1">
+            <a:schemeClr val="accent1"/>
+          </a:lnRef>
+          <a:fillRef idx="0">
+            <a:schemeClr val="accent1"/>
+          </a:fillRef>
+          <a:effectRef idx="0">
+            <a:schemeClr val="accent1"/>
+          </a:effectRef>
+          <a:fontRef idx="minor">
+            <a:schemeClr val="tx1"/>
+          </a:fontRef>
+        </p:style>
+      </p:cxnSp>
+      <p:sp>
+        <p:nvSpPr>
+          <p:cNvPr id="44" name="TextBox 43"/>
+          <p:cNvSpPr txBox="1"/>
+          <p:nvPr/>
+        </p:nvSpPr>
+        <p:spPr>
+          <a:xfrm>
+            <a:off x="5595381" y="6032416"/>
+            <a:ext cx="3421064" cy="369332"/>
+          </a:xfrm>
+          <a:prstGeom prst="rect">
+            <a:avLst/>
+          </a:prstGeom>
+          <a:noFill/>
+        </p:spPr>
+        <p:txBody>
+          <a:bodyPr wrap="square" rtlCol="0">
+            <a:spAutoFit/>
+          </a:bodyPr>
+          <a:lstStyle/>
+          <a:p>
+            <a:pPr algn="ctr"/>
+            <a:r>
+              <a:rPr lang="en-GB" sz="1800" dirty="0" err="1" smtClean="0"/>
+              <a:t>SetPageFilter</a:t>
+            </a:r>
+            <a:endParaRPr lang="en-GB" sz="1800" dirty="0"/>
+          </a:p>
+        </p:txBody>
+      </p:sp>
+      <p:cxnSp>
+        <p:nvCxnSpPr>
+          <p:cNvPr id="45" name="Straight Arrow Connector 44"/>
+          <p:cNvCxnSpPr/>
+          <p:nvPr/>
+        </p:nvCxnSpPr>
+        <p:spPr>
+          <a:xfrm>
+            <a:off x="3500978" y="6508940"/>
+            <a:ext cx="7632118" cy="0"/>
+          </a:xfrm>
+          <a:prstGeom prst="straightConnector1">
+            <a:avLst/>
+          </a:prstGeom>
+          <a:ln w="38100">
+            <a:solidFill>
+              <a:schemeClr val="tx1"/>
+            </a:solidFill>
+            <a:tailEnd type="triangle"/>
+          </a:ln>
+        </p:spPr>
+        <p:style>
+          <a:lnRef idx="1">
+            <a:schemeClr val="accent1"/>
+          </a:lnRef>
+          <a:fillRef idx="0">
+            <a:schemeClr val="accent1"/>
+          </a:fillRef>
+          <a:effectRef idx="0">
+            <a:schemeClr val="accent1"/>
+          </a:effectRef>
+          <a:fontRef idx="minor">
+            <a:schemeClr val="tx1"/>
+          </a:fontRef>
+        </p:style>
+      </p:cxnSp>
+      <p:cxnSp>
+        <p:nvCxnSpPr>
+          <p:cNvPr id="7" name="Straight Connector 6"/>
+          <p:cNvCxnSpPr/>
+          <p:nvPr/>
+        </p:nvCxnSpPr>
+        <p:spPr>
+          <a:xfrm>
+            <a:off x="3183871" y="1773016"/>
+            <a:ext cx="0" cy="1025397"/>
+          </a:xfrm>
+          <a:prstGeom prst="line">
+            <a:avLst/>
+          </a:prstGeom>
         </p:spPr>
         <p:style>
           <a:lnRef idx="3">
@@ -3672,70 +3776,58 @@
       </p:cxnSp>
       <p:sp>
         <p:nvSpPr>
-          <p:cNvPr id="36" name="TextBox 35"/>
-          <p:cNvSpPr txBox="1"/>
+          <p:cNvPr id="11" name="Smiley Face 10"/>
+          <p:cNvSpPr/>
           <p:nvPr/>
         </p:nvSpPr>
         <p:spPr>
           <a:xfrm>
-            <a:off x="223250" y="5883741"/>
-            <a:ext cx="1607425" cy="923330"/>
-          </a:xfrm>
-          <a:prstGeom prst="rect">
+            <a:off x="2777800" y="1093419"/>
+            <a:ext cx="755374" cy="733721"/>
+          </a:xfrm>
+          <a:prstGeom prst="smileyFace">
             <a:avLst/>
           </a:prstGeom>
         </p:spPr>
         <p:style>
           <a:lnRef idx="2">
-            <a:schemeClr val="dk1"/>
+            <a:schemeClr val="accent1">
+              <a:shade val="50000"/>
+            </a:schemeClr>
           </a:lnRef>
           <a:fillRef idx="1">
-            <a:schemeClr val="lt1"/>
+            <a:schemeClr val="accent1"/>
           </a:fillRef>
           <a:effectRef idx="0">
-            <a:schemeClr val="dk1"/>
+            <a:schemeClr val="accent1"/>
           </a:effectRef>
           <a:fontRef idx="minor">
-            <a:schemeClr val="dk1"/>
+            <a:schemeClr val="lt1"/>
           </a:fontRef>
         </p:style>
         <p:txBody>
-          <a:bodyPr wrap="square" rtlCol="0">
-            <a:spAutoFit/>
-          </a:bodyPr>
+          <a:bodyPr rtlCol="0" anchor="ctr"/>
           <a:lstStyle/>
           <a:p>
             <a:pPr algn="ctr"/>
-            <a:r>
-              <a:rPr lang="en-GB" sz="1800" dirty="0"/>
-              <a:t>Start typing in the search input field</a:t>
-            </a:r>
+            <a:endParaRPr lang="en-GB"/>
           </a:p>
         </p:txBody>
       </p:sp>
       <p:cxnSp>
         <p:nvCxnSpPr>
-          <p:cNvPr id="37" name="Curved Connector 36"/>
-          <p:cNvCxnSpPr>
-            <a:stCxn id="36" idx="3"/>
-            <a:endCxn id="18" idx="1"/>
-          </p:cNvCxnSpPr>
+          <p:cNvPr id="13" name="Straight Connector 12"/>
+          <p:cNvCxnSpPr/>
           <p:nvPr/>
         </p:nvCxnSpPr>
         <p:spPr>
-          <a:xfrm flipV="1">
-            <a:off x="1830675" y="5786814"/>
-            <a:ext cx="3438961" cy="558592"/>
-          </a:xfrm>
-          <a:prstGeom prst="curvedConnector3">
-            <a:avLst>
-              <a:gd name="adj1" fmla="val 50000"/>
-            </a:avLst>
+          <a:xfrm>
+            <a:off x="2639157" y="2067053"/>
+            <a:ext cx="1089428" cy="0"/>
+          </a:xfrm>
+          <a:prstGeom prst="line">
+            <a:avLst/>
           </a:prstGeom>
-          <a:ln w="28575">
-            <a:headEnd type="none" w="med" len="med"/>
-            <a:tailEnd type="triangle" w="med" len="med"/>
-          </a:ln>
         </p:spPr>
         <p:style>
           <a:lnRef idx="3">
@@ -3752,72 +3844,20 @@
           </a:fontRef>
         </p:style>
       </p:cxnSp>
-      <p:sp>
-        <p:nvSpPr>
-          <p:cNvPr id="41" name="TextBox 40"/>
-          <p:cNvSpPr txBox="1"/>
+      <p:cxnSp>
+        <p:nvCxnSpPr>
+          <p:cNvPr id="50" name="Straight Connector 49"/>
+          <p:cNvCxnSpPr/>
           <p:nvPr/>
-        </p:nvSpPr>
-        <p:spPr>
-          <a:xfrm>
-            <a:off x="12079978" y="6023773"/>
-            <a:ext cx="2418732" cy="646331"/>
-          </a:xfrm>
-          <a:prstGeom prst="rect">
+        </p:nvCxnSpPr>
+        <p:spPr>
+          <a:xfrm>
+            <a:off x="3183871" y="2798413"/>
+            <a:ext cx="349303" cy="311442"/>
+          </a:xfrm>
+          <a:prstGeom prst="line">
             <a:avLst/>
           </a:prstGeom>
-        </p:spPr>
-        <p:style>
-          <a:lnRef idx="2">
-            <a:schemeClr val="dk1"/>
-          </a:lnRef>
-          <a:fillRef idx="1">
-            <a:schemeClr val="lt1"/>
-          </a:fillRef>
-          <a:effectRef idx="0">
-            <a:schemeClr val="dk1"/>
-          </a:effectRef>
-          <a:fontRef idx="minor">
-            <a:schemeClr val="dk1"/>
-          </a:fontRef>
-        </p:style>
-        <p:txBody>
-          <a:bodyPr wrap="square" rtlCol="0">
-            <a:spAutoFit/>
-          </a:bodyPr>
-          <a:lstStyle/>
-          <a:p>
-            <a:pPr algn="ctr"/>
-            <a:r>
-              <a:rPr lang="en-GB" sz="1800" dirty="0"/>
-              <a:t>Provides suggestions while typing</a:t>
-            </a:r>
-          </a:p>
-        </p:txBody>
-      </p:sp>
-      <p:cxnSp>
-        <p:nvCxnSpPr>
-          <p:cNvPr id="42" name="Curved Connector 41"/>
-          <p:cNvCxnSpPr>
-            <a:stCxn id="41" idx="1"/>
-            <a:endCxn id="16" idx="3"/>
-          </p:cNvCxnSpPr>
-          <p:nvPr/>
-        </p:nvCxnSpPr>
-        <p:spPr>
-          <a:xfrm rot="10800000" flipV="1">
-            <a:off x="9263808" y="6346938"/>
-            <a:ext cx="2816171" cy="18533"/>
-          </a:xfrm>
-          <a:prstGeom prst="curvedConnector3">
-            <a:avLst>
-              <a:gd name="adj1" fmla="val 50000"/>
-            </a:avLst>
-          </a:prstGeom>
-          <a:ln w="28575">
-            <a:headEnd type="none" w="med" len="med"/>
-            <a:tailEnd type="triangle" w="med" len="med"/>
-          </a:ln>
         </p:spPr>
         <p:style>
           <a:lnRef idx="3">
@@ -3834,448 +3874,20 @@
           </a:fontRef>
         </p:style>
       </p:cxnSp>
-      <p:sp>
-        <p:nvSpPr>
-          <p:cNvPr id="48" name="TextBox 47"/>
-          <p:cNvSpPr txBox="1"/>
-          <p:nvPr/>
-        </p:nvSpPr>
-        <p:spPr>
-          <a:xfrm>
-            <a:off x="391392" y="7536513"/>
-            <a:ext cx="2418732" cy="646331"/>
-          </a:xfrm>
-          <a:prstGeom prst="rect">
-            <a:avLst/>
-          </a:prstGeom>
-        </p:spPr>
-        <p:style>
-          <a:lnRef idx="2">
-            <a:schemeClr val="dk1"/>
-          </a:lnRef>
-          <a:fillRef idx="1">
-            <a:schemeClr val="lt1"/>
-          </a:fillRef>
-          <a:effectRef idx="0">
-            <a:schemeClr val="dk1"/>
-          </a:effectRef>
-          <a:fontRef idx="minor">
-            <a:schemeClr val="dk1"/>
-          </a:fontRef>
-        </p:style>
-        <p:txBody>
-          <a:bodyPr wrap="square" rtlCol="0">
-            <a:spAutoFit/>
-          </a:bodyPr>
-          <a:lstStyle/>
-          <a:p>
-            <a:pPr algn="ctr"/>
-            <a:r>
-              <a:rPr lang="en-GB" sz="1800" dirty="0"/>
-              <a:t>Press Enter or click on the search button</a:t>
-            </a:r>
-          </a:p>
-        </p:txBody>
-      </p:sp>
       <p:cxnSp>
         <p:nvCxnSpPr>
-          <p:cNvPr id="49" name="Curved Connector 48"/>
-          <p:cNvCxnSpPr>
-            <a:stCxn id="48" idx="3"/>
-            <a:endCxn id="23" idx="1"/>
-          </p:cNvCxnSpPr>
-          <p:nvPr/>
-        </p:nvCxnSpPr>
-        <p:spPr>
-          <a:xfrm flipV="1">
-            <a:off x="2810124" y="7262938"/>
-            <a:ext cx="2244674" cy="596741"/>
-          </a:xfrm>
-          <a:prstGeom prst="curvedConnector3">
-            <a:avLst>
-              <a:gd name="adj1" fmla="val 50000"/>
-            </a:avLst>
-          </a:prstGeom>
-          <a:ln w="28575">
-            <a:headEnd type="none" w="med" len="med"/>
-            <a:tailEnd type="triangle" w="med" len="med"/>
-          </a:ln>
-        </p:spPr>
-        <p:style>
-          <a:lnRef idx="3">
-            <a:schemeClr val="dk1"/>
-          </a:lnRef>
-          <a:fillRef idx="0">
-            <a:schemeClr val="dk1"/>
-          </a:fillRef>
-          <a:effectRef idx="2">
-            <a:schemeClr val="dk1"/>
-          </a:effectRef>
-          <a:fontRef idx="minor">
-            <a:schemeClr val="tx1"/>
-          </a:fontRef>
-        </p:style>
-      </p:cxnSp>
-      <p:sp>
-        <p:nvSpPr>
-          <p:cNvPr id="74" name="TextBox 73"/>
-          <p:cNvSpPr txBox="1"/>
-          <p:nvPr/>
-        </p:nvSpPr>
-        <p:spPr>
-          <a:xfrm>
-            <a:off x="12232378" y="7750972"/>
-            <a:ext cx="2570382" cy="923330"/>
-          </a:xfrm>
-          <a:prstGeom prst="rect">
-            <a:avLst/>
-          </a:prstGeom>
-        </p:spPr>
-        <p:style>
-          <a:lnRef idx="2">
-            <a:schemeClr val="dk1"/>
-          </a:lnRef>
-          <a:fillRef idx="1">
-            <a:schemeClr val="lt1"/>
-          </a:fillRef>
-          <a:effectRef idx="0">
-            <a:schemeClr val="dk1"/>
-          </a:effectRef>
-          <a:fontRef idx="minor">
-            <a:schemeClr val="dk1"/>
-          </a:fontRef>
-        </p:style>
-        <p:txBody>
-          <a:bodyPr wrap="square" rtlCol="0">
-            <a:spAutoFit/>
-          </a:bodyPr>
-          <a:lstStyle/>
-          <a:p>
-            <a:pPr algn="ctr"/>
-            <a:r>
-              <a:rPr lang="en-GB" sz="1800" dirty="0"/>
-              <a:t>Shows snippets of the documents matching the search input</a:t>
-            </a:r>
-          </a:p>
-        </p:txBody>
-      </p:sp>
-      <p:cxnSp>
-        <p:nvCxnSpPr>
-          <p:cNvPr id="75" name="Curved Connector 74"/>
-          <p:cNvCxnSpPr>
-            <a:stCxn id="74" idx="1"/>
-            <a:endCxn id="25" idx="3"/>
-          </p:cNvCxnSpPr>
-          <p:nvPr/>
-        </p:nvCxnSpPr>
-        <p:spPr>
-          <a:xfrm rot="10800000">
-            <a:off x="10684782" y="7940261"/>
-            <a:ext cx="1547596" cy="272377"/>
-          </a:xfrm>
-          <a:prstGeom prst="curvedConnector3">
-            <a:avLst>
-              <a:gd name="adj1" fmla="val 50000"/>
-            </a:avLst>
-          </a:prstGeom>
-          <a:ln w="28575">
-            <a:headEnd type="none" w="med" len="med"/>
-            <a:tailEnd type="triangle" w="med" len="med"/>
-          </a:ln>
-        </p:spPr>
-        <p:style>
-          <a:lnRef idx="3">
-            <a:schemeClr val="dk1"/>
-          </a:lnRef>
-          <a:fillRef idx="0">
-            <a:schemeClr val="dk1"/>
-          </a:fillRef>
-          <a:effectRef idx="2">
-            <a:schemeClr val="dk1"/>
-          </a:effectRef>
-          <a:fontRef idx="minor">
-            <a:schemeClr val="tx1"/>
-          </a:fontRef>
-        </p:style>
-      </p:cxnSp>
-      <p:sp>
-        <p:nvSpPr>
-          <p:cNvPr id="38" name="TextBox 37"/>
-          <p:cNvSpPr txBox="1"/>
-          <p:nvPr/>
-        </p:nvSpPr>
-        <p:spPr>
-          <a:xfrm>
-            <a:off x="5595381" y="3365485"/>
-            <a:ext cx="3421064" cy="369332"/>
-          </a:xfrm>
-          <a:prstGeom prst="rect">
-            <a:avLst/>
-          </a:prstGeom>
-          <a:noFill/>
-        </p:spPr>
-        <p:txBody>
-          <a:bodyPr wrap="square" rtlCol="0">
-            <a:spAutoFit/>
-          </a:bodyPr>
-          <a:lstStyle/>
-          <a:p>
-            <a:pPr algn="ctr"/>
-            <a:r>
-              <a:rPr lang="en-GB" sz="1800" dirty="0" err="1" smtClean="0"/>
-              <a:t>date_filter</a:t>
-            </a:r>
-            <a:endParaRPr lang="en-GB" sz="1800" dirty="0"/>
-          </a:p>
-        </p:txBody>
-      </p:sp>
-      <p:cxnSp>
-        <p:nvCxnSpPr>
-          <p:cNvPr id="39" name="Straight Arrow Connector 38"/>
+          <p:cNvPr id="51" name="Straight Connector 50"/>
           <p:cNvCxnSpPr/>
           <p:nvPr/>
         </p:nvCxnSpPr>
         <p:spPr>
-          <a:xfrm>
-            <a:off x="3500978" y="3842009"/>
-            <a:ext cx="7632118" cy="0"/>
-          </a:xfrm>
-          <a:prstGeom prst="straightConnector1">
+          <a:xfrm flipH="1">
+            <a:off x="2777800" y="2823825"/>
+            <a:ext cx="377688" cy="286029"/>
+          </a:xfrm>
+          <a:prstGeom prst="line">
             <a:avLst/>
           </a:prstGeom>
-          <a:ln w="57150">
-            <a:tailEnd type="triangle"/>
-          </a:ln>
-        </p:spPr>
-        <p:style>
-          <a:lnRef idx="1">
-            <a:schemeClr val="accent1"/>
-          </a:lnRef>
-          <a:fillRef idx="0">
-            <a:schemeClr val="accent1"/>
-          </a:fillRef>
-          <a:effectRef idx="0">
-            <a:schemeClr val="accent1"/>
-          </a:effectRef>
-          <a:fontRef idx="minor">
-            <a:schemeClr val="tx1"/>
-          </a:fontRef>
-        </p:style>
-      </p:cxnSp>
-      <p:sp>
-        <p:nvSpPr>
-          <p:cNvPr id="40" name="TextBox 39"/>
-          <p:cNvSpPr txBox="1"/>
-          <p:nvPr/>
-        </p:nvSpPr>
-        <p:spPr>
-          <a:xfrm>
-            <a:off x="391393" y="3365485"/>
-            <a:ext cx="2334210" cy="646331"/>
-          </a:xfrm>
-          <a:prstGeom prst="rect">
-            <a:avLst/>
-          </a:prstGeom>
-        </p:spPr>
-        <p:style>
-          <a:lnRef idx="2">
-            <a:schemeClr val="dk1"/>
-          </a:lnRef>
-          <a:fillRef idx="1">
-            <a:schemeClr val="lt1"/>
-          </a:fillRef>
-          <a:effectRef idx="0">
-            <a:schemeClr val="dk1"/>
-          </a:effectRef>
-          <a:fontRef idx="minor">
-            <a:schemeClr val="dk1"/>
-          </a:fontRef>
-        </p:style>
-        <p:txBody>
-          <a:bodyPr wrap="square" rtlCol="0">
-            <a:spAutoFit/>
-          </a:bodyPr>
-          <a:lstStyle/>
-          <a:p>
-            <a:pPr algn="ctr"/>
-            <a:r>
-              <a:rPr lang="en-GB" sz="1800" dirty="0" smtClean="0"/>
-              <a:t>Select specific time period (months)</a:t>
-            </a:r>
-            <a:endParaRPr lang="en-GB" sz="1800" dirty="0"/>
-          </a:p>
-        </p:txBody>
-      </p:sp>
-      <p:cxnSp>
-        <p:nvCxnSpPr>
-          <p:cNvPr id="43" name="Curved Connector 42"/>
-          <p:cNvCxnSpPr>
-            <a:stCxn id="40" idx="3"/>
-            <a:endCxn id="38" idx="1"/>
-          </p:cNvCxnSpPr>
-          <p:nvPr/>
-        </p:nvCxnSpPr>
-        <p:spPr>
-          <a:xfrm flipV="1">
-            <a:off x="2725603" y="3550151"/>
-            <a:ext cx="2869778" cy="138500"/>
-          </a:xfrm>
-          <a:prstGeom prst="curvedConnector3">
-            <a:avLst>
-              <a:gd name="adj1" fmla="val 50000"/>
-            </a:avLst>
-          </a:prstGeom>
-          <a:ln w="28575">
-            <a:headEnd type="none" w="med" len="med"/>
-            <a:tailEnd type="triangle" w="med" len="med"/>
-          </a:ln>
-        </p:spPr>
-        <p:style>
-          <a:lnRef idx="3">
-            <a:schemeClr val="dk1"/>
-          </a:lnRef>
-          <a:fillRef idx="0">
-            <a:schemeClr val="dk1"/>
-          </a:fillRef>
-          <a:effectRef idx="2">
-            <a:schemeClr val="dk1"/>
-          </a:effectRef>
-          <a:fontRef idx="minor">
-            <a:schemeClr val="tx1"/>
-          </a:fontRef>
-        </p:style>
-      </p:cxnSp>
-      <p:sp>
-        <p:nvSpPr>
-          <p:cNvPr id="44" name="TextBox 43"/>
-          <p:cNvSpPr txBox="1"/>
-          <p:nvPr/>
-        </p:nvSpPr>
-        <p:spPr>
-          <a:xfrm>
-            <a:off x="5595381" y="4237782"/>
-            <a:ext cx="3421064" cy="369332"/>
-          </a:xfrm>
-          <a:prstGeom prst="rect">
-            <a:avLst/>
-          </a:prstGeom>
-          <a:noFill/>
-        </p:spPr>
-        <p:txBody>
-          <a:bodyPr wrap="square" rtlCol="0">
-            <a:spAutoFit/>
-          </a:bodyPr>
-          <a:lstStyle/>
-          <a:p>
-            <a:pPr algn="ctr"/>
-            <a:r>
-              <a:rPr lang="en-GB" sz="1800" dirty="0" err="1" smtClean="0"/>
-              <a:t>page_filter</a:t>
-            </a:r>
-            <a:endParaRPr lang="en-GB" sz="1800" dirty="0"/>
-          </a:p>
-        </p:txBody>
-      </p:sp>
-      <p:cxnSp>
-        <p:nvCxnSpPr>
-          <p:cNvPr id="45" name="Straight Arrow Connector 44"/>
-          <p:cNvCxnSpPr/>
-          <p:nvPr/>
-        </p:nvCxnSpPr>
-        <p:spPr>
-          <a:xfrm>
-            <a:off x="3500978" y="4714306"/>
-            <a:ext cx="7632118" cy="0"/>
-          </a:xfrm>
-          <a:prstGeom prst="straightConnector1">
-            <a:avLst/>
-          </a:prstGeom>
-          <a:ln w="57150">
-            <a:tailEnd type="triangle"/>
-          </a:ln>
-        </p:spPr>
-        <p:style>
-          <a:lnRef idx="1">
-            <a:schemeClr val="accent1"/>
-          </a:lnRef>
-          <a:fillRef idx="0">
-            <a:schemeClr val="accent1"/>
-          </a:fillRef>
-          <a:effectRef idx="0">
-            <a:schemeClr val="accent1"/>
-          </a:effectRef>
-          <a:fontRef idx="minor">
-            <a:schemeClr val="tx1"/>
-          </a:fontRef>
-        </p:style>
-      </p:cxnSp>
-      <p:sp>
-        <p:nvSpPr>
-          <p:cNvPr id="46" name="TextBox 45"/>
-          <p:cNvSpPr txBox="1"/>
-          <p:nvPr/>
-        </p:nvSpPr>
-        <p:spPr>
-          <a:xfrm>
-            <a:off x="1289015" y="4178302"/>
-            <a:ext cx="1436588" cy="369332"/>
-          </a:xfrm>
-          <a:prstGeom prst="rect">
-            <a:avLst/>
-          </a:prstGeom>
-        </p:spPr>
-        <p:style>
-          <a:lnRef idx="2">
-            <a:schemeClr val="dk1"/>
-          </a:lnRef>
-          <a:fillRef idx="1">
-            <a:schemeClr val="lt1"/>
-          </a:fillRef>
-          <a:effectRef idx="0">
-            <a:schemeClr val="dk1"/>
-          </a:effectRef>
-          <a:fontRef idx="minor">
-            <a:schemeClr val="dk1"/>
-          </a:fontRef>
-        </p:style>
-        <p:txBody>
-          <a:bodyPr wrap="square" rtlCol="0">
-            <a:spAutoFit/>
-          </a:bodyPr>
-          <a:lstStyle/>
-          <a:p>
-            <a:pPr algn="ctr"/>
-            <a:r>
-              <a:rPr lang="en-GB" sz="1800" dirty="0" smtClean="0"/>
-              <a:t>Select Page</a:t>
-            </a:r>
-            <a:endParaRPr lang="en-GB" sz="1800" dirty="0"/>
-          </a:p>
-        </p:txBody>
-      </p:sp>
-      <p:cxnSp>
-        <p:nvCxnSpPr>
-          <p:cNvPr id="47" name="Curved Connector 46"/>
-          <p:cNvCxnSpPr>
-            <a:stCxn id="46" idx="3"/>
-            <a:endCxn id="44" idx="1"/>
-          </p:cNvCxnSpPr>
-          <p:nvPr/>
-        </p:nvCxnSpPr>
-        <p:spPr>
-          <a:xfrm>
-            <a:off x="2725603" y="4362968"/>
-            <a:ext cx="2869778" cy="59480"/>
-          </a:xfrm>
-          <a:prstGeom prst="curvedConnector3">
-            <a:avLst>
-              <a:gd name="adj1" fmla="val 50000"/>
-            </a:avLst>
-          </a:prstGeom>
-          <a:ln w="28575">
-            <a:headEnd type="none" w="med" len="med"/>
-            <a:tailEnd type="triangle" w="med" len="med"/>
-          </a:ln>
         </p:spPr>
         <p:style>
           <a:lnRef idx="3">

</xml_diff>